<commit_message>
Update path model and code
Update path model and code to incorporate landscape metrics
</commit_message>
<xml_diff>
--- a/figs/path_model.pptx
+++ b/figs/path_model.pptx
@@ -2,18 +2,18 @@
 <file path=ppt/presentation.xml><?xml version="1.0" encoding="utf-8"?>
 <p:presentation xmlns:a="http://schemas.openxmlformats.org/drawingml/2006/main" xmlns:r="http://schemas.openxmlformats.org/officeDocument/2006/relationships" xmlns:p="http://schemas.openxmlformats.org/presentationml/2006/main" saveSubsetFonts="1">
   <p:sldMasterIdLst>
-    <p:sldMasterId id="2147483648" r:id="rId1"/>
+    <p:sldMasterId id="2147483660" r:id="rId1"/>
   </p:sldMasterIdLst>
   <p:sldIdLst>
     <p:sldId id="256" r:id="rId2"/>
   </p:sldIdLst>
-  <p:sldSz cx="12192000" cy="6858000"/>
+  <p:sldSz cx="12801600" cy="9601200" type="A3"/>
   <p:notesSz cx="6858000" cy="9144000"/>
   <p:defaultTextStyle>
     <a:defPPr>
       <a:defRPr lang="en-US"/>
     </a:defPPr>
-    <a:lvl1pPr marL="0" algn="l" defTabSz="914400" rtl="0" eaLnBrk="1" latinLnBrk="0" hangingPunct="1">
+    <a:lvl1pPr marL="0" algn="l" defTabSz="457200" rtl="0" eaLnBrk="1" latinLnBrk="0" hangingPunct="1">
       <a:defRPr sz="1800" kern="1200">
         <a:solidFill>
           <a:schemeClr val="tx1"/>
@@ -23,7 +23,7 @@
         <a:cs typeface="+mn-cs"/>
       </a:defRPr>
     </a:lvl1pPr>
-    <a:lvl2pPr marL="457200" algn="l" defTabSz="914400" rtl="0" eaLnBrk="1" latinLnBrk="0" hangingPunct="1">
+    <a:lvl2pPr marL="457200" algn="l" defTabSz="457200" rtl="0" eaLnBrk="1" latinLnBrk="0" hangingPunct="1">
       <a:defRPr sz="1800" kern="1200">
         <a:solidFill>
           <a:schemeClr val="tx1"/>
@@ -33,7 +33,7 @@
         <a:cs typeface="+mn-cs"/>
       </a:defRPr>
     </a:lvl2pPr>
-    <a:lvl3pPr marL="914400" algn="l" defTabSz="914400" rtl="0" eaLnBrk="1" latinLnBrk="0" hangingPunct="1">
+    <a:lvl3pPr marL="914400" algn="l" defTabSz="457200" rtl="0" eaLnBrk="1" latinLnBrk="0" hangingPunct="1">
       <a:defRPr sz="1800" kern="1200">
         <a:solidFill>
           <a:schemeClr val="tx1"/>
@@ -43,7 +43,7 @@
         <a:cs typeface="+mn-cs"/>
       </a:defRPr>
     </a:lvl3pPr>
-    <a:lvl4pPr marL="1371600" algn="l" defTabSz="914400" rtl="0" eaLnBrk="1" latinLnBrk="0" hangingPunct="1">
+    <a:lvl4pPr marL="1371600" algn="l" defTabSz="457200" rtl="0" eaLnBrk="1" latinLnBrk="0" hangingPunct="1">
       <a:defRPr sz="1800" kern="1200">
         <a:solidFill>
           <a:schemeClr val="tx1"/>
@@ -53,7 +53,7 @@
         <a:cs typeface="+mn-cs"/>
       </a:defRPr>
     </a:lvl4pPr>
-    <a:lvl5pPr marL="1828800" algn="l" defTabSz="914400" rtl="0" eaLnBrk="1" latinLnBrk="0" hangingPunct="1">
+    <a:lvl5pPr marL="1828800" algn="l" defTabSz="457200" rtl="0" eaLnBrk="1" latinLnBrk="0" hangingPunct="1">
       <a:defRPr sz="1800" kern="1200">
         <a:solidFill>
           <a:schemeClr val="tx1"/>
@@ -63,7 +63,7 @@
         <a:cs typeface="+mn-cs"/>
       </a:defRPr>
     </a:lvl5pPr>
-    <a:lvl6pPr marL="2286000" algn="l" defTabSz="914400" rtl="0" eaLnBrk="1" latinLnBrk="0" hangingPunct="1">
+    <a:lvl6pPr marL="2286000" algn="l" defTabSz="457200" rtl="0" eaLnBrk="1" latinLnBrk="0" hangingPunct="1">
       <a:defRPr sz="1800" kern="1200">
         <a:solidFill>
           <a:schemeClr val="tx1"/>
@@ -73,7 +73,7 @@
         <a:cs typeface="+mn-cs"/>
       </a:defRPr>
     </a:lvl6pPr>
-    <a:lvl7pPr marL="2743200" algn="l" defTabSz="914400" rtl="0" eaLnBrk="1" latinLnBrk="0" hangingPunct="1">
+    <a:lvl7pPr marL="2743200" algn="l" defTabSz="457200" rtl="0" eaLnBrk="1" latinLnBrk="0" hangingPunct="1">
       <a:defRPr sz="1800" kern="1200">
         <a:solidFill>
           <a:schemeClr val="tx1"/>
@@ -83,7 +83,7 @@
         <a:cs typeface="+mn-cs"/>
       </a:defRPr>
     </a:lvl7pPr>
-    <a:lvl8pPr marL="3200400" algn="l" defTabSz="914400" rtl="0" eaLnBrk="1" latinLnBrk="0" hangingPunct="1">
+    <a:lvl8pPr marL="3200400" algn="l" defTabSz="457200" rtl="0" eaLnBrk="1" latinLnBrk="0" hangingPunct="1">
       <a:defRPr sz="1800" kern="1200">
         <a:solidFill>
           <a:schemeClr val="tx1"/>
@@ -93,7 +93,7 @@
         <a:cs typeface="+mn-cs"/>
       </a:defRPr>
     </a:lvl8pPr>
-    <a:lvl9pPr marL="3657600" algn="l" defTabSz="914400" rtl="0" eaLnBrk="1" latinLnBrk="0" hangingPunct="1">
+    <a:lvl9pPr marL="3657600" algn="l" defTabSz="457200" rtl="0" eaLnBrk="1" latinLnBrk="0" hangingPunct="1">
       <a:defRPr sz="1800" kern="1200">
         <a:solidFill>
           <a:schemeClr val="tx1"/>
@@ -141,15 +141,15 @@
         </p:nvSpPr>
         <p:spPr>
           <a:xfrm>
-            <a:off x="1524000" y="1122363"/>
-            <a:ext cx="9144000" cy="2387600"/>
+            <a:off x="960120" y="1571308"/>
+            <a:ext cx="10881360" cy="3342640"/>
           </a:xfrm>
         </p:spPr>
         <p:txBody>
           <a:bodyPr anchor="b"/>
           <a:lstStyle>
             <a:lvl1pPr algn="ctr">
-              <a:defRPr sz="6000"/>
+              <a:defRPr sz="8400"/>
             </a:lvl1pPr>
           </a:lstStyle>
           <a:p>
@@ -157,7 +157,7 @@
               <a:rPr lang="en-US" smtClean="0"/>
               <a:t>Click to edit Master title style</a:t>
             </a:r>
-            <a:endParaRPr lang="en-AU"/>
+            <a:endParaRPr lang="en-US" dirty="0"/>
           </a:p>
         </p:txBody>
       </p:sp>
@@ -173,8 +173,8 @@
         </p:nvSpPr>
         <p:spPr>
           <a:xfrm>
-            <a:off x="1524000" y="3602038"/>
-            <a:ext cx="9144000" cy="1655762"/>
+            <a:off x="1600200" y="5042853"/>
+            <a:ext cx="9601200" cy="2318067"/>
           </a:xfrm>
         </p:spPr>
         <p:txBody>
@@ -182,39 +182,39 @@
           <a:lstStyle>
             <a:lvl1pPr marL="0" indent="0" algn="ctr">
               <a:buNone/>
-              <a:defRPr sz="2400"/>
+              <a:defRPr sz="3360"/>
             </a:lvl1pPr>
-            <a:lvl2pPr marL="457200" indent="0" algn="ctr">
-              <a:buNone/>
-              <a:defRPr sz="2000"/>
+            <a:lvl2pPr marL="640080" indent="0" algn="ctr">
+              <a:buNone/>
+              <a:defRPr sz="2800"/>
             </a:lvl2pPr>
-            <a:lvl3pPr marL="914400" indent="0" algn="ctr">
-              <a:buNone/>
-              <a:defRPr sz="1800"/>
+            <a:lvl3pPr marL="1280160" indent="0" algn="ctr">
+              <a:buNone/>
+              <a:defRPr sz="2520"/>
             </a:lvl3pPr>
-            <a:lvl4pPr marL="1371600" indent="0" algn="ctr">
-              <a:buNone/>
-              <a:defRPr sz="1600"/>
+            <a:lvl4pPr marL="1920240" indent="0" algn="ctr">
+              <a:buNone/>
+              <a:defRPr sz="2240"/>
             </a:lvl4pPr>
-            <a:lvl5pPr marL="1828800" indent="0" algn="ctr">
-              <a:buNone/>
-              <a:defRPr sz="1600"/>
+            <a:lvl5pPr marL="2560320" indent="0" algn="ctr">
+              <a:buNone/>
+              <a:defRPr sz="2240"/>
             </a:lvl5pPr>
-            <a:lvl6pPr marL="2286000" indent="0" algn="ctr">
-              <a:buNone/>
-              <a:defRPr sz="1600"/>
+            <a:lvl6pPr marL="3200400" indent="0" algn="ctr">
+              <a:buNone/>
+              <a:defRPr sz="2240"/>
             </a:lvl6pPr>
-            <a:lvl7pPr marL="2743200" indent="0" algn="ctr">
-              <a:buNone/>
-              <a:defRPr sz="1600"/>
+            <a:lvl7pPr marL="3840480" indent="0" algn="ctr">
+              <a:buNone/>
+              <a:defRPr sz="2240"/>
             </a:lvl7pPr>
-            <a:lvl8pPr marL="3200400" indent="0" algn="ctr">
-              <a:buNone/>
-              <a:defRPr sz="1600"/>
+            <a:lvl8pPr marL="4480560" indent="0" algn="ctr">
+              <a:buNone/>
+              <a:defRPr sz="2240"/>
             </a:lvl8pPr>
-            <a:lvl9pPr marL="3657600" indent="0" algn="ctr">
-              <a:buNone/>
-              <a:defRPr sz="1600"/>
+            <a:lvl9pPr marL="5120640" indent="0" algn="ctr">
+              <a:buNone/>
+              <a:defRPr sz="2240"/>
             </a:lvl9pPr>
           </a:lstStyle>
           <a:p>
@@ -222,7 +222,7 @@
               <a:rPr lang="en-US" smtClean="0"/>
               <a:t>Click to edit Master subtitle style</a:t>
             </a:r>
-            <a:endParaRPr lang="en-AU"/>
+            <a:endParaRPr lang="en-US" dirty="0"/>
           </a:p>
         </p:txBody>
       </p:sp>
@@ -243,7 +243,7 @@
           <a:p>
             <a:fld id="{DB7CD7B3-52EF-468D-94B0-37918E93325C}" type="datetimeFigureOut">
               <a:rPr lang="en-AU" smtClean="0"/>
-              <a:t>12/09/2019</a:t>
+              <a:t>6/10/2019</a:t>
             </a:fld>
             <a:endParaRPr lang="en-AU"/>
           </a:p>
@@ -294,7 +294,7 @@
     </p:spTree>
     <p:extLst>
       <p:ext uri="{BB962C8B-B14F-4D97-AF65-F5344CB8AC3E}">
-        <p14:creationId xmlns:p14="http://schemas.microsoft.com/office/powerpoint/2010/main" val="1605472281"/>
+        <p14:creationId xmlns:p14="http://schemas.microsoft.com/office/powerpoint/2010/main" val="3760062338"/>
       </p:ext>
     </p:extLst>
   </p:cSld>
@@ -340,7 +340,7 @@
               <a:rPr lang="en-US" smtClean="0"/>
               <a:t>Click to edit Master title style</a:t>
             </a:r>
-            <a:endParaRPr lang="en-AU"/>
+            <a:endParaRPr lang="en-US" dirty="0"/>
           </a:p>
         </p:txBody>
       </p:sp>
@@ -392,7 +392,7 @@
               <a:rPr lang="en-US" smtClean="0"/>
               <a:t>Fifth level</a:t>
             </a:r>
-            <a:endParaRPr lang="en-AU"/>
+            <a:endParaRPr lang="en-US" dirty="0"/>
           </a:p>
         </p:txBody>
       </p:sp>
@@ -413,7 +413,7 @@
           <a:p>
             <a:fld id="{DB7CD7B3-52EF-468D-94B0-37918E93325C}" type="datetimeFigureOut">
               <a:rPr lang="en-AU" smtClean="0"/>
-              <a:t>12/09/2019</a:t>
+              <a:t>6/10/2019</a:t>
             </a:fld>
             <a:endParaRPr lang="en-AU"/>
           </a:p>
@@ -464,7 +464,7 @@
     </p:spTree>
     <p:extLst>
       <p:ext uri="{BB962C8B-B14F-4D97-AF65-F5344CB8AC3E}">
-        <p14:creationId xmlns:p14="http://schemas.microsoft.com/office/powerpoint/2010/main" val="4047855729"/>
+        <p14:creationId xmlns:p14="http://schemas.microsoft.com/office/powerpoint/2010/main" val="1020831294"/>
       </p:ext>
     </p:extLst>
   </p:cSld>
@@ -503,8 +503,8 @@
         </p:nvSpPr>
         <p:spPr>
           <a:xfrm>
-            <a:off x="8724900" y="365125"/>
-            <a:ext cx="2628900" cy="5811838"/>
+            <a:off x="9161146" y="511175"/>
+            <a:ext cx="2760345" cy="8136573"/>
           </a:xfrm>
         </p:spPr>
         <p:txBody>
@@ -515,7 +515,7 @@
               <a:rPr lang="en-US" smtClean="0"/>
               <a:t>Click to edit Master title style</a:t>
             </a:r>
-            <a:endParaRPr lang="en-AU"/>
+            <a:endParaRPr lang="en-US" dirty="0"/>
           </a:p>
         </p:txBody>
       </p:sp>
@@ -531,8 +531,8 @@
         </p:nvSpPr>
         <p:spPr>
           <a:xfrm>
-            <a:off x="838200" y="365125"/>
-            <a:ext cx="7734300" cy="5811838"/>
+            <a:off x="880111" y="511175"/>
+            <a:ext cx="8121015" cy="8136573"/>
           </a:xfrm>
         </p:spPr>
         <p:txBody>
@@ -572,7 +572,7 @@
               <a:rPr lang="en-US" smtClean="0"/>
               <a:t>Fifth level</a:t>
             </a:r>
-            <a:endParaRPr lang="en-AU"/>
+            <a:endParaRPr lang="en-US" dirty="0"/>
           </a:p>
         </p:txBody>
       </p:sp>
@@ -593,7 +593,7 @@
           <a:p>
             <a:fld id="{DB7CD7B3-52EF-468D-94B0-37918E93325C}" type="datetimeFigureOut">
               <a:rPr lang="en-AU" smtClean="0"/>
-              <a:t>12/09/2019</a:t>
+              <a:t>6/10/2019</a:t>
             </a:fld>
             <a:endParaRPr lang="en-AU"/>
           </a:p>
@@ -644,7 +644,7 @@
     </p:spTree>
     <p:extLst>
       <p:ext uri="{BB962C8B-B14F-4D97-AF65-F5344CB8AC3E}">
-        <p14:creationId xmlns:p14="http://schemas.microsoft.com/office/powerpoint/2010/main" val="1249253639"/>
+        <p14:creationId xmlns:p14="http://schemas.microsoft.com/office/powerpoint/2010/main" val="3419121795"/>
       </p:ext>
     </p:extLst>
   </p:cSld>
@@ -690,7 +690,7 @@
               <a:rPr lang="en-US" smtClean="0"/>
               <a:t>Click to edit Master title style</a:t>
             </a:r>
-            <a:endParaRPr lang="en-AU"/>
+            <a:endParaRPr lang="en-US" dirty="0"/>
           </a:p>
         </p:txBody>
       </p:sp>
@@ -742,7 +742,7 @@
               <a:rPr lang="en-US" smtClean="0"/>
               <a:t>Fifth level</a:t>
             </a:r>
-            <a:endParaRPr lang="en-AU"/>
+            <a:endParaRPr lang="en-US" dirty="0"/>
           </a:p>
         </p:txBody>
       </p:sp>
@@ -763,7 +763,7 @@
           <a:p>
             <a:fld id="{DB7CD7B3-52EF-468D-94B0-37918E93325C}" type="datetimeFigureOut">
               <a:rPr lang="en-AU" smtClean="0"/>
-              <a:t>12/09/2019</a:t>
+              <a:t>6/10/2019</a:t>
             </a:fld>
             <a:endParaRPr lang="en-AU"/>
           </a:p>
@@ -814,7 +814,7 @@
     </p:spTree>
     <p:extLst>
       <p:ext uri="{BB962C8B-B14F-4D97-AF65-F5344CB8AC3E}">
-        <p14:creationId xmlns:p14="http://schemas.microsoft.com/office/powerpoint/2010/main" val="2232233478"/>
+        <p14:creationId xmlns:p14="http://schemas.microsoft.com/office/powerpoint/2010/main" val="652612768"/>
       </p:ext>
     </p:extLst>
   </p:cSld>
@@ -853,15 +853,15 @@
         </p:nvSpPr>
         <p:spPr>
           <a:xfrm>
-            <a:off x="831850" y="1709738"/>
-            <a:ext cx="10515600" cy="2852737"/>
+            <a:off x="873443" y="2393635"/>
+            <a:ext cx="11041380" cy="3993832"/>
           </a:xfrm>
         </p:spPr>
         <p:txBody>
           <a:bodyPr anchor="b"/>
           <a:lstStyle>
             <a:lvl1pPr>
-              <a:defRPr sz="6000"/>
+              <a:defRPr sz="8400"/>
             </a:lvl1pPr>
           </a:lstStyle>
           <a:p>
@@ -869,7 +869,7 @@
               <a:rPr lang="en-US" smtClean="0"/>
               <a:t>Click to edit Master title style</a:t>
             </a:r>
-            <a:endParaRPr lang="en-AU"/>
+            <a:endParaRPr lang="en-US" dirty="0"/>
           </a:p>
         </p:txBody>
       </p:sp>
@@ -885,8 +885,8 @@
         </p:nvSpPr>
         <p:spPr>
           <a:xfrm>
-            <a:off x="831850" y="4589463"/>
-            <a:ext cx="10515600" cy="1500187"/>
+            <a:off x="873443" y="6425250"/>
+            <a:ext cx="11041380" cy="2100262"/>
           </a:xfrm>
         </p:spPr>
         <p:txBody>
@@ -894,17 +894,15 @@
           <a:lstStyle>
             <a:lvl1pPr marL="0" indent="0">
               <a:buNone/>
-              <a:defRPr sz="2400">
+              <a:defRPr sz="3360">
                 <a:solidFill>
-                  <a:schemeClr val="tx1">
-                    <a:tint val="75000"/>
-                  </a:schemeClr>
+                  <a:schemeClr val="tx1"/>
                 </a:solidFill>
               </a:defRPr>
             </a:lvl1pPr>
-            <a:lvl2pPr marL="457200" indent="0">
-              <a:buNone/>
-              <a:defRPr sz="2000">
+            <a:lvl2pPr marL="640080" indent="0">
+              <a:buNone/>
+              <a:defRPr sz="2800">
                 <a:solidFill>
                   <a:schemeClr val="tx1">
                     <a:tint val="75000"/>
@@ -912,9 +910,9 @@
                 </a:solidFill>
               </a:defRPr>
             </a:lvl2pPr>
-            <a:lvl3pPr marL="914400" indent="0">
-              <a:buNone/>
-              <a:defRPr sz="1800">
+            <a:lvl3pPr marL="1280160" indent="0">
+              <a:buNone/>
+              <a:defRPr sz="2520">
                 <a:solidFill>
                   <a:schemeClr val="tx1">
                     <a:tint val="75000"/>
@@ -922,9 +920,9 @@
                 </a:solidFill>
               </a:defRPr>
             </a:lvl3pPr>
-            <a:lvl4pPr marL="1371600" indent="0">
-              <a:buNone/>
-              <a:defRPr sz="1600">
+            <a:lvl4pPr marL="1920240" indent="0">
+              <a:buNone/>
+              <a:defRPr sz="2240">
                 <a:solidFill>
                   <a:schemeClr val="tx1">
                     <a:tint val="75000"/>
@@ -932,9 +930,9 @@
                 </a:solidFill>
               </a:defRPr>
             </a:lvl4pPr>
-            <a:lvl5pPr marL="1828800" indent="0">
-              <a:buNone/>
-              <a:defRPr sz="1600">
+            <a:lvl5pPr marL="2560320" indent="0">
+              <a:buNone/>
+              <a:defRPr sz="2240">
                 <a:solidFill>
                   <a:schemeClr val="tx1">
                     <a:tint val="75000"/>
@@ -942,9 +940,9 @@
                 </a:solidFill>
               </a:defRPr>
             </a:lvl5pPr>
-            <a:lvl6pPr marL="2286000" indent="0">
-              <a:buNone/>
-              <a:defRPr sz="1600">
+            <a:lvl6pPr marL="3200400" indent="0">
+              <a:buNone/>
+              <a:defRPr sz="2240">
                 <a:solidFill>
                   <a:schemeClr val="tx1">
                     <a:tint val="75000"/>
@@ -952,9 +950,9 @@
                 </a:solidFill>
               </a:defRPr>
             </a:lvl6pPr>
-            <a:lvl7pPr marL="2743200" indent="0">
-              <a:buNone/>
-              <a:defRPr sz="1600">
+            <a:lvl7pPr marL="3840480" indent="0">
+              <a:buNone/>
+              <a:defRPr sz="2240">
                 <a:solidFill>
                   <a:schemeClr val="tx1">
                     <a:tint val="75000"/>
@@ -962,9 +960,9 @@
                 </a:solidFill>
               </a:defRPr>
             </a:lvl7pPr>
-            <a:lvl8pPr marL="3200400" indent="0">
-              <a:buNone/>
-              <a:defRPr sz="1600">
+            <a:lvl8pPr marL="4480560" indent="0">
+              <a:buNone/>
+              <a:defRPr sz="2240">
                 <a:solidFill>
                   <a:schemeClr val="tx1">
                     <a:tint val="75000"/>
@@ -972,9 +970,9 @@
                 </a:solidFill>
               </a:defRPr>
             </a:lvl8pPr>
-            <a:lvl9pPr marL="3657600" indent="0">
-              <a:buNone/>
-              <a:defRPr sz="1600">
+            <a:lvl9pPr marL="5120640" indent="0">
+              <a:buNone/>
+              <a:defRPr sz="2240">
                 <a:solidFill>
                   <a:schemeClr val="tx1">
                     <a:tint val="75000"/>
@@ -1009,7 +1007,7 @@
           <a:p>
             <a:fld id="{DB7CD7B3-52EF-468D-94B0-37918E93325C}" type="datetimeFigureOut">
               <a:rPr lang="en-AU" smtClean="0"/>
-              <a:t>12/09/2019</a:t>
+              <a:t>6/10/2019</a:t>
             </a:fld>
             <a:endParaRPr lang="en-AU"/>
           </a:p>
@@ -1060,7 +1058,7 @@
     </p:spTree>
     <p:extLst>
       <p:ext uri="{BB962C8B-B14F-4D97-AF65-F5344CB8AC3E}">
-        <p14:creationId xmlns:p14="http://schemas.microsoft.com/office/powerpoint/2010/main" val="1736450468"/>
+        <p14:creationId xmlns:p14="http://schemas.microsoft.com/office/powerpoint/2010/main" val="1953911671"/>
       </p:ext>
     </p:extLst>
   </p:cSld>
@@ -1106,7 +1104,7 @@
               <a:rPr lang="en-US" smtClean="0"/>
               <a:t>Click to edit Master title style</a:t>
             </a:r>
-            <a:endParaRPr lang="en-AU"/>
+            <a:endParaRPr lang="en-US" dirty="0"/>
           </a:p>
         </p:txBody>
       </p:sp>
@@ -1122,8 +1120,8 @@
         </p:nvSpPr>
         <p:spPr>
           <a:xfrm>
-            <a:off x="838200" y="1825625"/>
-            <a:ext cx="5181600" cy="4351338"/>
+            <a:off x="880110" y="2555875"/>
+            <a:ext cx="5440680" cy="6091873"/>
           </a:xfrm>
         </p:spPr>
         <p:txBody>
@@ -1163,7 +1161,7 @@
               <a:rPr lang="en-US" smtClean="0"/>
               <a:t>Fifth level</a:t>
             </a:r>
-            <a:endParaRPr lang="en-AU"/>
+            <a:endParaRPr lang="en-US" dirty="0"/>
           </a:p>
         </p:txBody>
       </p:sp>
@@ -1179,8 +1177,8 @@
         </p:nvSpPr>
         <p:spPr>
           <a:xfrm>
-            <a:off x="6172200" y="1825625"/>
-            <a:ext cx="5181600" cy="4351338"/>
+            <a:off x="6480810" y="2555875"/>
+            <a:ext cx="5440680" cy="6091873"/>
           </a:xfrm>
         </p:spPr>
         <p:txBody>
@@ -1220,7 +1218,7 @@
               <a:rPr lang="en-US" smtClean="0"/>
               <a:t>Fifth level</a:t>
             </a:r>
-            <a:endParaRPr lang="en-AU"/>
+            <a:endParaRPr lang="en-US" dirty="0"/>
           </a:p>
         </p:txBody>
       </p:sp>
@@ -1241,7 +1239,7 @@
           <a:p>
             <a:fld id="{DB7CD7B3-52EF-468D-94B0-37918E93325C}" type="datetimeFigureOut">
               <a:rPr lang="en-AU" smtClean="0"/>
-              <a:t>12/09/2019</a:t>
+              <a:t>6/10/2019</a:t>
             </a:fld>
             <a:endParaRPr lang="en-AU"/>
           </a:p>
@@ -1292,7 +1290,7 @@
     </p:spTree>
     <p:extLst>
       <p:ext uri="{BB962C8B-B14F-4D97-AF65-F5344CB8AC3E}">
-        <p14:creationId xmlns:p14="http://schemas.microsoft.com/office/powerpoint/2010/main" val="3554632276"/>
+        <p14:creationId xmlns:p14="http://schemas.microsoft.com/office/powerpoint/2010/main" val="4249699902"/>
       </p:ext>
     </p:extLst>
   </p:cSld>
@@ -1331,8 +1329,8 @@
         </p:nvSpPr>
         <p:spPr>
           <a:xfrm>
-            <a:off x="839788" y="365125"/>
-            <a:ext cx="10515600" cy="1325563"/>
+            <a:off x="881777" y="511177"/>
+            <a:ext cx="11041380" cy="1855788"/>
           </a:xfrm>
         </p:spPr>
         <p:txBody>
@@ -1343,7 +1341,7 @@
               <a:rPr lang="en-US" smtClean="0"/>
               <a:t>Click to edit Master title style</a:t>
             </a:r>
-            <a:endParaRPr lang="en-AU"/>
+            <a:endParaRPr lang="en-US" dirty="0"/>
           </a:p>
         </p:txBody>
       </p:sp>
@@ -1359,8 +1357,8 @@
         </p:nvSpPr>
         <p:spPr>
           <a:xfrm>
-            <a:off x="839788" y="1681163"/>
-            <a:ext cx="5157787" cy="823912"/>
+            <a:off x="881779" y="2353628"/>
+            <a:ext cx="5415676" cy="1153477"/>
           </a:xfrm>
         </p:spPr>
         <p:txBody>
@@ -1368,39 +1366,39 @@
           <a:lstStyle>
             <a:lvl1pPr marL="0" indent="0">
               <a:buNone/>
-              <a:defRPr sz="2400" b="1"/>
+              <a:defRPr sz="3360" b="1"/>
             </a:lvl1pPr>
-            <a:lvl2pPr marL="457200" indent="0">
-              <a:buNone/>
-              <a:defRPr sz="2000" b="1"/>
+            <a:lvl2pPr marL="640080" indent="0">
+              <a:buNone/>
+              <a:defRPr sz="2800" b="1"/>
             </a:lvl2pPr>
-            <a:lvl3pPr marL="914400" indent="0">
-              <a:buNone/>
-              <a:defRPr sz="1800" b="1"/>
+            <a:lvl3pPr marL="1280160" indent="0">
+              <a:buNone/>
+              <a:defRPr sz="2520" b="1"/>
             </a:lvl3pPr>
-            <a:lvl4pPr marL="1371600" indent="0">
-              <a:buNone/>
-              <a:defRPr sz="1600" b="1"/>
+            <a:lvl4pPr marL="1920240" indent="0">
+              <a:buNone/>
+              <a:defRPr sz="2240" b="1"/>
             </a:lvl4pPr>
-            <a:lvl5pPr marL="1828800" indent="0">
-              <a:buNone/>
-              <a:defRPr sz="1600" b="1"/>
+            <a:lvl5pPr marL="2560320" indent="0">
+              <a:buNone/>
+              <a:defRPr sz="2240" b="1"/>
             </a:lvl5pPr>
-            <a:lvl6pPr marL="2286000" indent="0">
-              <a:buNone/>
-              <a:defRPr sz="1600" b="1"/>
+            <a:lvl6pPr marL="3200400" indent="0">
+              <a:buNone/>
+              <a:defRPr sz="2240" b="1"/>
             </a:lvl6pPr>
-            <a:lvl7pPr marL="2743200" indent="0">
-              <a:buNone/>
-              <a:defRPr sz="1600" b="1"/>
+            <a:lvl7pPr marL="3840480" indent="0">
+              <a:buNone/>
+              <a:defRPr sz="2240" b="1"/>
             </a:lvl7pPr>
-            <a:lvl8pPr marL="3200400" indent="0">
-              <a:buNone/>
-              <a:defRPr sz="1600" b="1"/>
+            <a:lvl8pPr marL="4480560" indent="0">
+              <a:buNone/>
+              <a:defRPr sz="2240" b="1"/>
             </a:lvl8pPr>
-            <a:lvl9pPr marL="3657600" indent="0">
-              <a:buNone/>
-              <a:defRPr sz="1600" b="1"/>
+            <a:lvl9pPr marL="5120640" indent="0">
+              <a:buNone/>
+              <a:defRPr sz="2240" b="1"/>
             </a:lvl9pPr>
           </a:lstStyle>
           <a:p>
@@ -1424,8 +1422,8 @@
         </p:nvSpPr>
         <p:spPr>
           <a:xfrm>
-            <a:off x="839788" y="2505075"/>
-            <a:ext cx="5157787" cy="3684588"/>
+            <a:off x="881779" y="3507105"/>
+            <a:ext cx="5415676" cy="5158423"/>
           </a:xfrm>
         </p:spPr>
         <p:txBody>
@@ -1465,7 +1463,7 @@
               <a:rPr lang="en-US" smtClean="0"/>
               <a:t>Fifth level</a:t>
             </a:r>
-            <a:endParaRPr lang="en-AU"/>
+            <a:endParaRPr lang="en-US" dirty="0"/>
           </a:p>
         </p:txBody>
       </p:sp>
@@ -1481,8 +1479,8 @@
         </p:nvSpPr>
         <p:spPr>
           <a:xfrm>
-            <a:off x="6172200" y="1681163"/>
-            <a:ext cx="5183188" cy="823912"/>
+            <a:off x="6480811" y="2353628"/>
+            <a:ext cx="5442347" cy="1153477"/>
           </a:xfrm>
         </p:spPr>
         <p:txBody>
@@ -1490,39 +1488,39 @@
           <a:lstStyle>
             <a:lvl1pPr marL="0" indent="0">
               <a:buNone/>
-              <a:defRPr sz="2400" b="1"/>
+              <a:defRPr sz="3360" b="1"/>
             </a:lvl1pPr>
-            <a:lvl2pPr marL="457200" indent="0">
-              <a:buNone/>
-              <a:defRPr sz="2000" b="1"/>
+            <a:lvl2pPr marL="640080" indent="0">
+              <a:buNone/>
+              <a:defRPr sz="2800" b="1"/>
             </a:lvl2pPr>
-            <a:lvl3pPr marL="914400" indent="0">
-              <a:buNone/>
-              <a:defRPr sz="1800" b="1"/>
+            <a:lvl3pPr marL="1280160" indent="0">
+              <a:buNone/>
+              <a:defRPr sz="2520" b="1"/>
             </a:lvl3pPr>
-            <a:lvl4pPr marL="1371600" indent="0">
-              <a:buNone/>
-              <a:defRPr sz="1600" b="1"/>
+            <a:lvl4pPr marL="1920240" indent="0">
+              <a:buNone/>
+              <a:defRPr sz="2240" b="1"/>
             </a:lvl4pPr>
-            <a:lvl5pPr marL="1828800" indent="0">
-              <a:buNone/>
-              <a:defRPr sz="1600" b="1"/>
+            <a:lvl5pPr marL="2560320" indent="0">
+              <a:buNone/>
+              <a:defRPr sz="2240" b="1"/>
             </a:lvl5pPr>
-            <a:lvl6pPr marL="2286000" indent="0">
-              <a:buNone/>
-              <a:defRPr sz="1600" b="1"/>
+            <a:lvl6pPr marL="3200400" indent="0">
+              <a:buNone/>
+              <a:defRPr sz="2240" b="1"/>
             </a:lvl6pPr>
-            <a:lvl7pPr marL="2743200" indent="0">
-              <a:buNone/>
-              <a:defRPr sz="1600" b="1"/>
+            <a:lvl7pPr marL="3840480" indent="0">
+              <a:buNone/>
+              <a:defRPr sz="2240" b="1"/>
             </a:lvl7pPr>
-            <a:lvl8pPr marL="3200400" indent="0">
-              <a:buNone/>
-              <a:defRPr sz="1600" b="1"/>
+            <a:lvl8pPr marL="4480560" indent="0">
+              <a:buNone/>
+              <a:defRPr sz="2240" b="1"/>
             </a:lvl8pPr>
-            <a:lvl9pPr marL="3657600" indent="0">
-              <a:buNone/>
-              <a:defRPr sz="1600" b="1"/>
+            <a:lvl9pPr marL="5120640" indent="0">
+              <a:buNone/>
+              <a:defRPr sz="2240" b="1"/>
             </a:lvl9pPr>
           </a:lstStyle>
           <a:p>
@@ -1546,8 +1544,8 @@
         </p:nvSpPr>
         <p:spPr>
           <a:xfrm>
-            <a:off x="6172200" y="2505075"/>
-            <a:ext cx="5183188" cy="3684588"/>
+            <a:off x="6480811" y="3507105"/>
+            <a:ext cx="5442347" cy="5158423"/>
           </a:xfrm>
         </p:spPr>
         <p:txBody>
@@ -1587,7 +1585,7 @@
               <a:rPr lang="en-US" smtClean="0"/>
               <a:t>Fifth level</a:t>
             </a:r>
-            <a:endParaRPr lang="en-AU"/>
+            <a:endParaRPr lang="en-US" dirty="0"/>
           </a:p>
         </p:txBody>
       </p:sp>
@@ -1608,7 +1606,7 @@
           <a:p>
             <a:fld id="{DB7CD7B3-52EF-468D-94B0-37918E93325C}" type="datetimeFigureOut">
               <a:rPr lang="en-AU" smtClean="0"/>
-              <a:t>12/09/2019</a:t>
+              <a:t>6/10/2019</a:t>
             </a:fld>
             <a:endParaRPr lang="en-AU"/>
           </a:p>
@@ -1659,7 +1657,7 @@
     </p:spTree>
     <p:extLst>
       <p:ext uri="{BB962C8B-B14F-4D97-AF65-F5344CB8AC3E}">
-        <p14:creationId xmlns:p14="http://schemas.microsoft.com/office/powerpoint/2010/main" val="4279291136"/>
+        <p14:creationId xmlns:p14="http://schemas.microsoft.com/office/powerpoint/2010/main" val="4172345159"/>
       </p:ext>
     </p:extLst>
   </p:cSld>
@@ -1705,7 +1703,7 @@
               <a:rPr lang="en-US" smtClean="0"/>
               <a:t>Click to edit Master title style</a:t>
             </a:r>
-            <a:endParaRPr lang="en-AU"/>
+            <a:endParaRPr lang="en-US" dirty="0"/>
           </a:p>
         </p:txBody>
       </p:sp>
@@ -1726,7 +1724,7 @@
           <a:p>
             <a:fld id="{DB7CD7B3-52EF-468D-94B0-37918E93325C}" type="datetimeFigureOut">
               <a:rPr lang="en-AU" smtClean="0"/>
-              <a:t>12/09/2019</a:t>
+              <a:t>6/10/2019</a:t>
             </a:fld>
             <a:endParaRPr lang="en-AU"/>
           </a:p>
@@ -1777,7 +1775,7 @@
     </p:spTree>
     <p:extLst>
       <p:ext uri="{BB962C8B-B14F-4D97-AF65-F5344CB8AC3E}">
-        <p14:creationId xmlns:p14="http://schemas.microsoft.com/office/powerpoint/2010/main" val="999829049"/>
+        <p14:creationId xmlns:p14="http://schemas.microsoft.com/office/powerpoint/2010/main" val="1054609761"/>
       </p:ext>
     </p:extLst>
   </p:cSld>
@@ -1821,7 +1819,7 @@
           <a:p>
             <a:fld id="{DB7CD7B3-52EF-468D-94B0-37918E93325C}" type="datetimeFigureOut">
               <a:rPr lang="en-AU" smtClean="0"/>
-              <a:t>12/09/2019</a:t>
+              <a:t>6/10/2019</a:t>
             </a:fld>
             <a:endParaRPr lang="en-AU"/>
           </a:p>
@@ -1872,7 +1870,7 @@
     </p:spTree>
     <p:extLst>
       <p:ext uri="{BB962C8B-B14F-4D97-AF65-F5344CB8AC3E}">
-        <p14:creationId xmlns:p14="http://schemas.microsoft.com/office/powerpoint/2010/main" val="2925278252"/>
+        <p14:creationId xmlns:p14="http://schemas.microsoft.com/office/powerpoint/2010/main" val="435260053"/>
       </p:ext>
     </p:extLst>
   </p:cSld>
@@ -1911,15 +1909,15 @@
         </p:nvSpPr>
         <p:spPr>
           <a:xfrm>
-            <a:off x="839788" y="457200"/>
-            <a:ext cx="3932237" cy="1600200"/>
+            <a:off x="881778" y="640080"/>
+            <a:ext cx="4128849" cy="2240280"/>
           </a:xfrm>
         </p:spPr>
         <p:txBody>
           <a:bodyPr anchor="b"/>
           <a:lstStyle>
             <a:lvl1pPr>
-              <a:defRPr sz="3200"/>
+              <a:defRPr sz="4480"/>
             </a:lvl1pPr>
           </a:lstStyle>
           <a:p>
@@ -1927,7 +1925,7 @@
               <a:rPr lang="en-US" smtClean="0"/>
               <a:t>Click to edit Master title style</a:t>
             </a:r>
-            <a:endParaRPr lang="en-AU"/>
+            <a:endParaRPr lang="en-US" dirty="0"/>
           </a:p>
         </p:txBody>
       </p:sp>
@@ -1943,39 +1941,39 @@
         </p:nvSpPr>
         <p:spPr>
           <a:xfrm>
-            <a:off x="5183188" y="987425"/>
-            <a:ext cx="6172200" cy="4873625"/>
+            <a:off x="5442347" y="1382397"/>
+            <a:ext cx="6480810" cy="6823075"/>
           </a:xfrm>
         </p:spPr>
         <p:txBody>
           <a:bodyPr/>
           <a:lstStyle>
             <a:lvl1pPr>
-              <a:defRPr sz="3200"/>
+              <a:defRPr sz="4480"/>
             </a:lvl1pPr>
             <a:lvl2pPr>
-              <a:defRPr sz="2800"/>
+              <a:defRPr sz="3920"/>
             </a:lvl2pPr>
             <a:lvl3pPr>
-              <a:defRPr sz="2400"/>
+              <a:defRPr sz="3360"/>
             </a:lvl3pPr>
             <a:lvl4pPr>
-              <a:defRPr sz="2000"/>
+              <a:defRPr sz="2800"/>
             </a:lvl4pPr>
             <a:lvl5pPr>
-              <a:defRPr sz="2000"/>
+              <a:defRPr sz="2800"/>
             </a:lvl5pPr>
             <a:lvl6pPr>
-              <a:defRPr sz="2000"/>
+              <a:defRPr sz="2800"/>
             </a:lvl6pPr>
             <a:lvl7pPr>
-              <a:defRPr sz="2000"/>
+              <a:defRPr sz="2800"/>
             </a:lvl7pPr>
             <a:lvl8pPr>
-              <a:defRPr sz="2000"/>
+              <a:defRPr sz="2800"/>
             </a:lvl8pPr>
             <a:lvl9pPr>
-              <a:defRPr sz="2000"/>
+              <a:defRPr sz="2800"/>
             </a:lvl9pPr>
           </a:lstStyle>
           <a:p>
@@ -2012,7 +2010,7 @@
               <a:rPr lang="en-US" smtClean="0"/>
               <a:t>Fifth level</a:t>
             </a:r>
-            <a:endParaRPr lang="en-AU"/>
+            <a:endParaRPr lang="en-US" dirty="0"/>
           </a:p>
         </p:txBody>
       </p:sp>
@@ -2028,8 +2026,8 @@
         </p:nvSpPr>
         <p:spPr>
           <a:xfrm>
-            <a:off x="839788" y="2057400"/>
-            <a:ext cx="3932237" cy="3811588"/>
+            <a:off x="881778" y="2880360"/>
+            <a:ext cx="4128849" cy="5336223"/>
           </a:xfrm>
         </p:spPr>
         <p:txBody>
@@ -2037,39 +2035,39 @@
           <a:lstStyle>
             <a:lvl1pPr marL="0" indent="0">
               <a:buNone/>
-              <a:defRPr sz="1600"/>
+              <a:defRPr sz="2240"/>
             </a:lvl1pPr>
-            <a:lvl2pPr marL="457200" indent="0">
+            <a:lvl2pPr marL="640080" indent="0">
+              <a:buNone/>
+              <a:defRPr sz="1960"/>
+            </a:lvl2pPr>
+            <a:lvl3pPr marL="1280160" indent="0">
+              <a:buNone/>
+              <a:defRPr sz="1680"/>
+            </a:lvl3pPr>
+            <a:lvl4pPr marL="1920240" indent="0">
               <a:buNone/>
               <a:defRPr sz="1400"/>
-            </a:lvl2pPr>
-            <a:lvl3pPr marL="914400" indent="0">
-              <a:buNone/>
-              <a:defRPr sz="1200"/>
-            </a:lvl3pPr>
-            <a:lvl4pPr marL="1371600" indent="0">
-              <a:buNone/>
-              <a:defRPr sz="1000"/>
             </a:lvl4pPr>
-            <a:lvl5pPr marL="1828800" indent="0">
-              <a:buNone/>
-              <a:defRPr sz="1000"/>
+            <a:lvl5pPr marL="2560320" indent="0">
+              <a:buNone/>
+              <a:defRPr sz="1400"/>
             </a:lvl5pPr>
-            <a:lvl6pPr marL="2286000" indent="0">
-              <a:buNone/>
-              <a:defRPr sz="1000"/>
+            <a:lvl6pPr marL="3200400" indent="0">
+              <a:buNone/>
+              <a:defRPr sz="1400"/>
             </a:lvl6pPr>
-            <a:lvl7pPr marL="2743200" indent="0">
-              <a:buNone/>
-              <a:defRPr sz="1000"/>
+            <a:lvl7pPr marL="3840480" indent="0">
+              <a:buNone/>
+              <a:defRPr sz="1400"/>
             </a:lvl7pPr>
-            <a:lvl8pPr marL="3200400" indent="0">
-              <a:buNone/>
-              <a:defRPr sz="1000"/>
+            <a:lvl8pPr marL="4480560" indent="0">
+              <a:buNone/>
+              <a:defRPr sz="1400"/>
             </a:lvl8pPr>
-            <a:lvl9pPr marL="3657600" indent="0">
-              <a:buNone/>
-              <a:defRPr sz="1000"/>
+            <a:lvl9pPr marL="5120640" indent="0">
+              <a:buNone/>
+              <a:defRPr sz="1400"/>
             </a:lvl9pPr>
           </a:lstStyle>
           <a:p>
@@ -2098,7 +2096,7 @@
           <a:p>
             <a:fld id="{DB7CD7B3-52EF-468D-94B0-37918E93325C}" type="datetimeFigureOut">
               <a:rPr lang="en-AU" smtClean="0"/>
-              <a:t>12/09/2019</a:t>
+              <a:t>6/10/2019</a:t>
             </a:fld>
             <a:endParaRPr lang="en-AU"/>
           </a:p>
@@ -2149,7 +2147,7 @@
     </p:spTree>
     <p:extLst>
       <p:ext uri="{BB962C8B-B14F-4D97-AF65-F5344CB8AC3E}">
-        <p14:creationId xmlns:p14="http://schemas.microsoft.com/office/powerpoint/2010/main" val="4245360045"/>
+        <p14:creationId xmlns:p14="http://schemas.microsoft.com/office/powerpoint/2010/main" val="3484165181"/>
       </p:ext>
     </p:extLst>
   </p:cSld>
@@ -2188,15 +2186,15 @@
         </p:nvSpPr>
         <p:spPr>
           <a:xfrm>
-            <a:off x="839788" y="457200"/>
-            <a:ext cx="3932237" cy="1600200"/>
+            <a:off x="881778" y="640080"/>
+            <a:ext cx="4128849" cy="2240280"/>
           </a:xfrm>
         </p:spPr>
         <p:txBody>
           <a:bodyPr anchor="b"/>
           <a:lstStyle>
             <a:lvl1pPr>
-              <a:defRPr sz="3200"/>
+              <a:defRPr sz="4480"/>
             </a:lvl1pPr>
           </a:lstStyle>
           <a:p>
@@ -2204,7 +2202,7 @@
               <a:rPr lang="en-US" smtClean="0"/>
               <a:t>Click to edit Master title style</a:t>
             </a:r>
-            <a:endParaRPr lang="en-AU"/>
+            <a:endParaRPr lang="en-US" dirty="0"/>
           </a:p>
         </p:txBody>
       </p:sp>
@@ -2212,7 +2210,7 @@
         <p:nvSpPr>
           <p:cNvPr id="3" name="Picture Placeholder 2"/>
           <p:cNvSpPr>
-            <a:spLocks noGrp="1"/>
+            <a:spLocks noGrp="1" noChangeAspect="1"/>
           </p:cNvSpPr>
           <p:nvPr>
             <p:ph type="pic" idx="1"/>
@@ -2220,8 +2218,73 @@
         </p:nvSpPr>
         <p:spPr>
           <a:xfrm>
-            <a:off x="5183188" y="987425"/>
-            <a:ext cx="6172200" cy="4873625"/>
+            <a:off x="5442347" y="1382397"/>
+            <a:ext cx="6480810" cy="6823075"/>
+          </a:xfrm>
+        </p:spPr>
+        <p:txBody>
+          <a:bodyPr anchor="t"/>
+          <a:lstStyle>
+            <a:lvl1pPr marL="0" indent="0">
+              <a:buNone/>
+              <a:defRPr sz="4480"/>
+            </a:lvl1pPr>
+            <a:lvl2pPr marL="640080" indent="0">
+              <a:buNone/>
+              <a:defRPr sz="3920"/>
+            </a:lvl2pPr>
+            <a:lvl3pPr marL="1280160" indent="0">
+              <a:buNone/>
+              <a:defRPr sz="3360"/>
+            </a:lvl3pPr>
+            <a:lvl4pPr marL="1920240" indent="0">
+              <a:buNone/>
+              <a:defRPr sz="2800"/>
+            </a:lvl4pPr>
+            <a:lvl5pPr marL="2560320" indent="0">
+              <a:buNone/>
+              <a:defRPr sz="2800"/>
+            </a:lvl5pPr>
+            <a:lvl6pPr marL="3200400" indent="0">
+              <a:buNone/>
+              <a:defRPr sz="2800"/>
+            </a:lvl6pPr>
+            <a:lvl7pPr marL="3840480" indent="0">
+              <a:buNone/>
+              <a:defRPr sz="2800"/>
+            </a:lvl7pPr>
+            <a:lvl8pPr marL="4480560" indent="0">
+              <a:buNone/>
+              <a:defRPr sz="2800"/>
+            </a:lvl8pPr>
+            <a:lvl9pPr marL="5120640" indent="0">
+              <a:buNone/>
+              <a:defRPr sz="2800"/>
+            </a:lvl9pPr>
+          </a:lstStyle>
+          <a:p>
+            <a:r>
+              <a:rPr lang="en-US" smtClean="0"/>
+              <a:t>Click icon to add picture</a:t>
+            </a:r>
+            <a:endParaRPr lang="en-US" dirty="0"/>
+          </a:p>
+        </p:txBody>
+      </p:sp>
+      <p:sp>
+        <p:nvSpPr>
+          <p:cNvPr id="4" name="Text Placeholder 3"/>
+          <p:cNvSpPr>
+            <a:spLocks noGrp="1"/>
+          </p:cNvSpPr>
+          <p:nvPr>
+            <p:ph type="body" sz="half" idx="2"/>
+          </p:nvPr>
+        </p:nvSpPr>
+        <p:spPr>
+          <a:xfrm>
+            <a:off x="881778" y="2880360"/>
+            <a:ext cx="4128849" cy="5336223"/>
           </a:xfrm>
         </p:spPr>
         <p:txBody>
@@ -2229,103 +2292,42 @@
           <a:lstStyle>
             <a:lvl1pPr marL="0" indent="0">
               <a:buNone/>
-              <a:defRPr sz="3200"/>
+              <a:defRPr sz="2240"/>
             </a:lvl1pPr>
-            <a:lvl2pPr marL="457200" indent="0">
-              <a:buNone/>
-              <a:defRPr sz="2800"/>
+            <a:lvl2pPr marL="640080" indent="0">
+              <a:buNone/>
+              <a:defRPr sz="1960"/>
             </a:lvl2pPr>
-            <a:lvl3pPr marL="914400" indent="0">
-              <a:buNone/>
-              <a:defRPr sz="2400"/>
+            <a:lvl3pPr marL="1280160" indent="0">
+              <a:buNone/>
+              <a:defRPr sz="1680"/>
             </a:lvl3pPr>
-            <a:lvl4pPr marL="1371600" indent="0">
-              <a:buNone/>
-              <a:defRPr sz="2000"/>
+            <a:lvl4pPr marL="1920240" indent="0">
+              <a:buNone/>
+              <a:defRPr sz="1400"/>
             </a:lvl4pPr>
-            <a:lvl5pPr marL="1828800" indent="0">
-              <a:buNone/>
-              <a:defRPr sz="2000"/>
+            <a:lvl5pPr marL="2560320" indent="0">
+              <a:buNone/>
+              <a:defRPr sz="1400"/>
             </a:lvl5pPr>
-            <a:lvl6pPr marL="2286000" indent="0">
-              <a:buNone/>
-              <a:defRPr sz="2000"/>
+            <a:lvl6pPr marL="3200400" indent="0">
+              <a:buNone/>
+              <a:defRPr sz="1400"/>
             </a:lvl6pPr>
-            <a:lvl7pPr marL="2743200" indent="0">
-              <a:buNone/>
-              <a:defRPr sz="2000"/>
+            <a:lvl7pPr marL="3840480" indent="0">
+              <a:buNone/>
+              <a:defRPr sz="1400"/>
             </a:lvl7pPr>
-            <a:lvl8pPr marL="3200400" indent="0">
-              <a:buNone/>
-              <a:defRPr sz="2000"/>
+            <a:lvl8pPr marL="4480560" indent="0">
+              <a:buNone/>
+              <a:defRPr sz="1400"/>
             </a:lvl8pPr>
-            <a:lvl9pPr marL="3657600" indent="0">
-              <a:buNone/>
-              <a:defRPr sz="2000"/>
+            <a:lvl9pPr marL="5120640" indent="0">
+              <a:buNone/>
+              <a:defRPr sz="1400"/>
             </a:lvl9pPr>
           </a:lstStyle>
           <a:p>
-            <a:endParaRPr lang="en-AU"/>
-          </a:p>
-        </p:txBody>
-      </p:sp>
-      <p:sp>
-        <p:nvSpPr>
-          <p:cNvPr id="4" name="Text Placeholder 3"/>
-          <p:cNvSpPr>
-            <a:spLocks noGrp="1"/>
-          </p:cNvSpPr>
-          <p:nvPr>
-            <p:ph type="body" sz="half" idx="2"/>
-          </p:nvPr>
-        </p:nvSpPr>
-        <p:spPr>
-          <a:xfrm>
-            <a:off x="839788" y="2057400"/>
-            <a:ext cx="3932237" cy="3811588"/>
-          </a:xfrm>
-        </p:spPr>
-        <p:txBody>
-          <a:bodyPr/>
-          <a:lstStyle>
-            <a:lvl1pPr marL="0" indent="0">
-              <a:buNone/>
-              <a:defRPr sz="1600"/>
-            </a:lvl1pPr>
-            <a:lvl2pPr marL="457200" indent="0">
-              <a:buNone/>
-              <a:defRPr sz="1400"/>
-            </a:lvl2pPr>
-            <a:lvl3pPr marL="914400" indent="0">
-              <a:buNone/>
-              <a:defRPr sz="1200"/>
-            </a:lvl3pPr>
-            <a:lvl4pPr marL="1371600" indent="0">
-              <a:buNone/>
-              <a:defRPr sz="1000"/>
-            </a:lvl4pPr>
-            <a:lvl5pPr marL="1828800" indent="0">
-              <a:buNone/>
-              <a:defRPr sz="1000"/>
-            </a:lvl5pPr>
-            <a:lvl6pPr marL="2286000" indent="0">
-              <a:buNone/>
-              <a:defRPr sz="1000"/>
-            </a:lvl6pPr>
-            <a:lvl7pPr marL="2743200" indent="0">
-              <a:buNone/>
-              <a:defRPr sz="1000"/>
-            </a:lvl7pPr>
-            <a:lvl8pPr marL="3200400" indent="0">
-              <a:buNone/>
-              <a:defRPr sz="1000"/>
-            </a:lvl8pPr>
-            <a:lvl9pPr marL="3657600" indent="0">
-              <a:buNone/>
-              <a:defRPr sz="1000"/>
-            </a:lvl9pPr>
-          </a:lstStyle>
-          <a:p>
             <a:pPr lvl="0"/>
             <a:r>
               <a:rPr lang="en-US" smtClean="0"/>
@@ -2351,7 +2353,7 @@
           <a:p>
             <a:fld id="{DB7CD7B3-52EF-468D-94B0-37918E93325C}" type="datetimeFigureOut">
               <a:rPr lang="en-AU" smtClean="0"/>
-              <a:t>12/09/2019</a:t>
+              <a:t>6/10/2019</a:t>
             </a:fld>
             <a:endParaRPr lang="en-AU"/>
           </a:p>
@@ -2402,7 +2404,7 @@
     </p:spTree>
     <p:extLst>
       <p:ext uri="{BB962C8B-B14F-4D97-AF65-F5344CB8AC3E}">
-        <p14:creationId xmlns:p14="http://schemas.microsoft.com/office/powerpoint/2010/main" val="298635709"/>
+        <p14:creationId xmlns:p14="http://schemas.microsoft.com/office/powerpoint/2010/main" val="2560405026"/>
       </p:ext>
     </p:extLst>
   </p:cSld>
@@ -2446,8 +2448,8 @@
         </p:nvSpPr>
         <p:spPr>
           <a:xfrm>
-            <a:off x="838200" y="365125"/>
-            <a:ext cx="10515600" cy="1325563"/>
+            <a:off x="880110" y="511177"/>
+            <a:ext cx="11041380" cy="1855788"/>
           </a:xfrm>
           <a:prstGeom prst="rect">
             <a:avLst/>
@@ -2463,7 +2465,7 @@
               <a:rPr lang="en-US" smtClean="0"/>
               <a:t>Click to edit Master title style</a:t>
             </a:r>
-            <a:endParaRPr lang="en-AU"/>
+            <a:endParaRPr lang="en-US" dirty="0"/>
           </a:p>
         </p:txBody>
       </p:sp>
@@ -2479,8 +2481,8 @@
         </p:nvSpPr>
         <p:spPr>
           <a:xfrm>
-            <a:off x="838200" y="1825625"/>
-            <a:ext cx="10515600" cy="4351338"/>
+            <a:off x="880110" y="2555875"/>
+            <a:ext cx="11041380" cy="6091873"/>
           </a:xfrm>
           <a:prstGeom prst="rect">
             <a:avLst/>
@@ -2525,7 +2527,7 @@
               <a:rPr lang="en-US" smtClean="0"/>
               <a:t>Fifth level</a:t>
             </a:r>
-            <a:endParaRPr lang="en-AU"/>
+            <a:endParaRPr lang="en-US" dirty="0"/>
           </a:p>
         </p:txBody>
       </p:sp>
@@ -2541,8 +2543,8 @@
         </p:nvSpPr>
         <p:spPr>
           <a:xfrm>
-            <a:off x="838200" y="6356350"/>
-            <a:ext cx="2743200" cy="365125"/>
+            <a:off x="880110" y="8898892"/>
+            <a:ext cx="2880360" cy="511175"/>
           </a:xfrm>
           <a:prstGeom prst="rect">
             <a:avLst/>
@@ -2552,7 +2554,7 @@
           <a:bodyPr vert="horz" lIns="91440" tIns="45720" rIns="91440" bIns="45720" rtlCol="0" anchor="ctr"/>
           <a:lstStyle>
             <a:lvl1pPr algn="l">
-              <a:defRPr sz="1200">
+              <a:defRPr sz="1680">
                 <a:solidFill>
                   <a:schemeClr val="tx1">
                     <a:tint val="75000"/>
@@ -2564,7 +2566,7 @@
           <a:p>
             <a:fld id="{DB7CD7B3-52EF-468D-94B0-37918E93325C}" type="datetimeFigureOut">
               <a:rPr lang="en-AU" smtClean="0"/>
-              <a:t>12/09/2019</a:t>
+              <a:t>6/10/2019</a:t>
             </a:fld>
             <a:endParaRPr lang="en-AU"/>
           </a:p>
@@ -2582,8 +2584,8 @@
         </p:nvSpPr>
         <p:spPr>
           <a:xfrm>
-            <a:off x="4038600" y="6356350"/>
-            <a:ext cx="4114800" cy="365125"/>
+            <a:off x="4240530" y="8898892"/>
+            <a:ext cx="4320540" cy="511175"/>
           </a:xfrm>
           <a:prstGeom prst="rect">
             <a:avLst/>
@@ -2593,7 +2595,7 @@
           <a:bodyPr vert="horz" lIns="91440" tIns="45720" rIns="91440" bIns="45720" rtlCol="0" anchor="ctr"/>
           <a:lstStyle>
             <a:lvl1pPr algn="ctr">
-              <a:defRPr sz="1200">
+              <a:defRPr sz="1680">
                 <a:solidFill>
                   <a:schemeClr val="tx1">
                     <a:tint val="75000"/>
@@ -2619,8 +2621,8 @@
         </p:nvSpPr>
         <p:spPr>
           <a:xfrm>
-            <a:off x="8610600" y="6356350"/>
-            <a:ext cx="2743200" cy="365125"/>
+            <a:off x="9041130" y="8898892"/>
+            <a:ext cx="2880360" cy="511175"/>
           </a:xfrm>
           <a:prstGeom prst="rect">
             <a:avLst/>
@@ -2630,7 +2632,7 @@
           <a:bodyPr vert="horz" lIns="91440" tIns="45720" rIns="91440" bIns="45720" rtlCol="0" anchor="ctr"/>
           <a:lstStyle>
             <a:lvl1pPr algn="r">
-              <a:defRPr sz="1200">
+              <a:defRPr sz="1680">
                 <a:solidFill>
                   <a:schemeClr val="tx1">
                     <a:tint val="75000"/>
@@ -2651,27 +2653,27 @@
     </p:spTree>
     <p:extLst>
       <p:ext uri="{BB962C8B-B14F-4D97-AF65-F5344CB8AC3E}">
-        <p14:creationId xmlns:p14="http://schemas.microsoft.com/office/powerpoint/2010/main" val="3734011693"/>
+        <p14:creationId xmlns:p14="http://schemas.microsoft.com/office/powerpoint/2010/main" val="939497142"/>
       </p:ext>
     </p:extLst>
   </p:cSld>
   <p:clrMap bg1="lt1" tx1="dk1" bg2="lt2" tx2="dk2" accent1="accent1" accent2="accent2" accent3="accent3" accent4="accent4" accent5="accent5" accent6="accent6" hlink="hlink" folHlink="folHlink"/>
   <p:sldLayoutIdLst>
-    <p:sldLayoutId id="2147483649" r:id="rId1"/>
-    <p:sldLayoutId id="2147483650" r:id="rId2"/>
-    <p:sldLayoutId id="2147483651" r:id="rId3"/>
-    <p:sldLayoutId id="2147483652" r:id="rId4"/>
-    <p:sldLayoutId id="2147483653" r:id="rId5"/>
-    <p:sldLayoutId id="2147483654" r:id="rId6"/>
-    <p:sldLayoutId id="2147483655" r:id="rId7"/>
-    <p:sldLayoutId id="2147483656" r:id="rId8"/>
-    <p:sldLayoutId id="2147483657" r:id="rId9"/>
-    <p:sldLayoutId id="2147483658" r:id="rId10"/>
-    <p:sldLayoutId id="2147483659" r:id="rId11"/>
+    <p:sldLayoutId id="2147483661" r:id="rId1"/>
+    <p:sldLayoutId id="2147483662" r:id="rId2"/>
+    <p:sldLayoutId id="2147483663" r:id="rId3"/>
+    <p:sldLayoutId id="2147483664" r:id="rId4"/>
+    <p:sldLayoutId id="2147483665" r:id="rId5"/>
+    <p:sldLayoutId id="2147483666" r:id="rId6"/>
+    <p:sldLayoutId id="2147483667" r:id="rId7"/>
+    <p:sldLayoutId id="2147483668" r:id="rId8"/>
+    <p:sldLayoutId id="2147483669" r:id="rId9"/>
+    <p:sldLayoutId id="2147483670" r:id="rId10"/>
+    <p:sldLayoutId id="2147483671" r:id="rId11"/>
   </p:sldLayoutIdLst>
   <p:txStyles>
     <p:titleStyle>
-      <a:lvl1pPr algn="l" defTabSz="914400" rtl="0" eaLnBrk="1" latinLnBrk="0" hangingPunct="1">
+      <a:lvl1pPr algn="l" defTabSz="1280160" rtl="0" eaLnBrk="1" latinLnBrk="0" hangingPunct="1">
         <a:lnSpc>
           <a:spcPct val="90000"/>
         </a:lnSpc>
@@ -2679,7 +2681,7 @@
           <a:spcPct val="0"/>
         </a:spcBef>
         <a:buNone/>
-        <a:defRPr sz="4400" kern="1200">
+        <a:defRPr sz="6160" kern="1200">
           <a:solidFill>
             <a:schemeClr val="tx1"/>
           </a:solidFill>
@@ -2690,12 +2692,48 @@
       </a:lvl1pPr>
     </p:titleStyle>
     <p:bodyStyle>
-      <a:lvl1pPr marL="228600" indent="-228600" algn="l" defTabSz="914400" rtl="0" eaLnBrk="1" latinLnBrk="0" hangingPunct="1">
+      <a:lvl1pPr marL="320040" indent="-320040" algn="l" defTabSz="1280160" rtl="0" eaLnBrk="1" latinLnBrk="0" hangingPunct="1">
         <a:lnSpc>
           <a:spcPct val="90000"/>
         </a:lnSpc>
         <a:spcBef>
-          <a:spcPts val="1000"/>
+          <a:spcPts val="1400"/>
+        </a:spcBef>
+        <a:buFont typeface="Arial" panose="020B0604020202020204" pitchFamily="34" charset="0"/>
+        <a:buChar char="•"/>
+        <a:defRPr sz="3920" kern="1200">
+          <a:solidFill>
+            <a:schemeClr val="tx1"/>
+          </a:solidFill>
+          <a:latin typeface="+mn-lt"/>
+          <a:ea typeface="+mn-ea"/>
+          <a:cs typeface="+mn-cs"/>
+        </a:defRPr>
+      </a:lvl1pPr>
+      <a:lvl2pPr marL="960120" indent="-320040" algn="l" defTabSz="1280160" rtl="0" eaLnBrk="1" latinLnBrk="0" hangingPunct="1">
+        <a:lnSpc>
+          <a:spcPct val="90000"/>
+        </a:lnSpc>
+        <a:spcBef>
+          <a:spcPts val="700"/>
+        </a:spcBef>
+        <a:buFont typeface="Arial" panose="020B0604020202020204" pitchFamily="34" charset="0"/>
+        <a:buChar char="•"/>
+        <a:defRPr sz="3360" kern="1200">
+          <a:solidFill>
+            <a:schemeClr val="tx1"/>
+          </a:solidFill>
+          <a:latin typeface="+mn-lt"/>
+          <a:ea typeface="+mn-ea"/>
+          <a:cs typeface="+mn-cs"/>
+        </a:defRPr>
+      </a:lvl2pPr>
+      <a:lvl3pPr marL="1600200" indent="-320040" algn="l" defTabSz="1280160" rtl="0" eaLnBrk="1" latinLnBrk="0" hangingPunct="1">
+        <a:lnSpc>
+          <a:spcPct val="90000"/>
+        </a:lnSpc>
+        <a:spcBef>
+          <a:spcPts val="700"/>
         </a:spcBef>
         <a:buFont typeface="Arial" panose="020B0604020202020204" pitchFamily="34" charset="0"/>
         <a:buChar char="•"/>
@@ -2707,53 +2745,17 @@
           <a:ea typeface="+mn-ea"/>
           <a:cs typeface="+mn-cs"/>
         </a:defRPr>
-      </a:lvl1pPr>
-      <a:lvl2pPr marL="685800" indent="-228600" algn="l" defTabSz="914400" rtl="0" eaLnBrk="1" latinLnBrk="0" hangingPunct="1">
+      </a:lvl3pPr>
+      <a:lvl4pPr marL="2240280" indent="-320040" algn="l" defTabSz="1280160" rtl="0" eaLnBrk="1" latinLnBrk="0" hangingPunct="1">
         <a:lnSpc>
           <a:spcPct val="90000"/>
         </a:lnSpc>
         <a:spcBef>
-          <a:spcPts val="500"/>
+          <a:spcPts val="700"/>
         </a:spcBef>
         <a:buFont typeface="Arial" panose="020B0604020202020204" pitchFamily="34" charset="0"/>
         <a:buChar char="•"/>
-        <a:defRPr sz="2400" kern="1200">
-          <a:solidFill>
-            <a:schemeClr val="tx1"/>
-          </a:solidFill>
-          <a:latin typeface="+mn-lt"/>
-          <a:ea typeface="+mn-ea"/>
-          <a:cs typeface="+mn-cs"/>
-        </a:defRPr>
-      </a:lvl2pPr>
-      <a:lvl3pPr marL="1143000" indent="-228600" algn="l" defTabSz="914400" rtl="0" eaLnBrk="1" latinLnBrk="0" hangingPunct="1">
-        <a:lnSpc>
-          <a:spcPct val="90000"/>
-        </a:lnSpc>
-        <a:spcBef>
-          <a:spcPts val="500"/>
-        </a:spcBef>
-        <a:buFont typeface="Arial" panose="020B0604020202020204" pitchFamily="34" charset="0"/>
-        <a:buChar char="•"/>
-        <a:defRPr sz="2000" kern="1200">
-          <a:solidFill>
-            <a:schemeClr val="tx1"/>
-          </a:solidFill>
-          <a:latin typeface="+mn-lt"/>
-          <a:ea typeface="+mn-ea"/>
-          <a:cs typeface="+mn-cs"/>
-        </a:defRPr>
-      </a:lvl3pPr>
-      <a:lvl4pPr marL="1600200" indent="-228600" algn="l" defTabSz="914400" rtl="0" eaLnBrk="1" latinLnBrk="0" hangingPunct="1">
-        <a:lnSpc>
-          <a:spcPct val="90000"/>
-        </a:lnSpc>
-        <a:spcBef>
-          <a:spcPts val="500"/>
-        </a:spcBef>
-        <a:buFont typeface="Arial" panose="020B0604020202020204" pitchFamily="34" charset="0"/>
-        <a:buChar char="•"/>
-        <a:defRPr sz="1800" kern="1200">
+        <a:defRPr sz="2520" kern="1200">
           <a:solidFill>
             <a:schemeClr val="tx1"/>
           </a:solidFill>
@@ -2762,16 +2764,16 @@
           <a:cs typeface="+mn-cs"/>
         </a:defRPr>
       </a:lvl4pPr>
-      <a:lvl5pPr marL="2057400" indent="-228600" algn="l" defTabSz="914400" rtl="0" eaLnBrk="1" latinLnBrk="0" hangingPunct="1">
+      <a:lvl5pPr marL="2880360" indent="-320040" algn="l" defTabSz="1280160" rtl="0" eaLnBrk="1" latinLnBrk="0" hangingPunct="1">
         <a:lnSpc>
           <a:spcPct val="90000"/>
         </a:lnSpc>
         <a:spcBef>
-          <a:spcPts val="500"/>
+          <a:spcPts val="700"/>
         </a:spcBef>
         <a:buFont typeface="Arial" panose="020B0604020202020204" pitchFamily="34" charset="0"/>
         <a:buChar char="•"/>
-        <a:defRPr sz="1800" kern="1200">
+        <a:defRPr sz="2520" kern="1200">
           <a:solidFill>
             <a:schemeClr val="tx1"/>
           </a:solidFill>
@@ -2780,16 +2782,16 @@
           <a:cs typeface="+mn-cs"/>
         </a:defRPr>
       </a:lvl5pPr>
-      <a:lvl6pPr marL="2514600" indent="-228600" algn="l" defTabSz="914400" rtl="0" eaLnBrk="1" latinLnBrk="0" hangingPunct="1">
+      <a:lvl6pPr marL="3520440" indent="-320040" algn="l" defTabSz="1280160" rtl="0" eaLnBrk="1" latinLnBrk="0" hangingPunct="1">
         <a:lnSpc>
           <a:spcPct val="90000"/>
         </a:lnSpc>
         <a:spcBef>
-          <a:spcPts val="500"/>
+          <a:spcPts val="700"/>
         </a:spcBef>
         <a:buFont typeface="Arial" panose="020B0604020202020204" pitchFamily="34" charset="0"/>
         <a:buChar char="•"/>
-        <a:defRPr sz="1800" kern="1200">
+        <a:defRPr sz="2520" kern="1200">
           <a:solidFill>
             <a:schemeClr val="tx1"/>
           </a:solidFill>
@@ -2798,16 +2800,16 @@
           <a:cs typeface="+mn-cs"/>
         </a:defRPr>
       </a:lvl6pPr>
-      <a:lvl7pPr marL="2971800" indent="-228600" algn="l" defTabSz="914400" rtl="0" eaLnBrk="1" latinLnBrk="0" hangingPunct="1">
+      <a:lvl7pPr marL="4160520" indent="-320040" algn="l" defTabSz="1280160" rtl="0" eaLnBrk="1" latinLnBrk="0" hangingPunct="1">
         <a:lnSpc>
           <a:spcPct val="90000"/>
         </a:lnSpc>
         <a:spcBef>
-          <a:spcPts val="500"/>
+          <a:spcPts val="700"/>
         </a:spcBef>
         <a:buFont typeface="Arial" panose="020B0604020202020204" pitchFamily="34" charset="0"/>
         <a:buChar char="•"/>
-        <a:defRPr sz="1800" kern="1200">
+        <a:defRPr sz="2520" kern="1200">
           <a:solidFill>
             <a:schemeClr val="tx1"/>
           </a:solidFill>
@@ -2816,16 +2818,16 @@
           <a:cs typeface="+mn-cs"/>
         </a:defRPr>
       </a:lvl7pPr>
-      <a:lvl8pPr marL="3429000" indent="-228600" algn="l" defTabSz="914400" rtl="0" eaLnBrk="1" latinLnBrk="0" hangingPunct="1">
+      <a:lvl8pPr marL="4800600" indent="-320040" algn="l" defTabSz="1280160" rtl="0" eaLnBrk="1" latinLnBrk="0" hangingPunct="1">
         <a:lnSpc>
           <a:spcPct val="90000"/>
         </a:lnSpc>
         <a:spcBef>
-          <a:spcPts val="500"/>
+          <a:spcPts val="700"/>
         </a:spcBef>
         <a:buFont typeface="Arial" panose="020B0604020202020204" pitchFamily="34" charset="0"/>
         <a:buChar char="•"/>
-        <a:defRPr sz="1800" kern="1200">
+        <a:defRPr sz="2520" kern="1200">
           <a:solidFill>
             <a:schemeClr val="tx1"/>
           </a:solidFill>
@@ -2834,16 +2836,16 @@
           <a:cs typeface="+mn-cs"/>
         </a:defRPr>
       </a:lvl8pPr>
-      <a:lvl9pPr marL="3886200" indent="-228600" algn="l" defTabSz="914400" rtl="0" eaLnBrk="1" latinLnBrk="0" hangingPunct="1">
+      <a:lvl9pPr marL="5440680" indent="-320040" algn="l" defTabSz="1280160" rtl="0" eaLnBrk="1" latinLnBrk="0" hangingPunct="1">
         <a:lnSpc>
           <a:spcPct val="90000"/>
         </a:lnSpc>
         <a:spcBef>
-          <a:spcPts val="500"/>
+          <a:spcPts val="700"/>
         </a:spcBef>
         <a:buFont typeface="Arial" panose="020B0604020202020204" pitchFamily="34" charset="0"/>
         <a:buChar char="•"/>
-        <a:defRPr sz="1800" kern="1200">
+        <a:defRPr sz="2520" kern="1200">
           <a:solidFill>
             <a:schemeClr val="tx1"/>
           </a:solidFill>
@@ -2857,8 +2859,8 @@
       <a:defPPr>
         <a:defRPr lang="en-US"/>
       </a:defPPr>
-      <a:lvl1pPr marL="0" algn="l" defTabSz="914400" rtl="0" eaLnBrk="1" latinLnBrk="0" hangingPunct="1">
-        <a:defRPr sz="1800" kern="1200">
+      <a:lvl1pPr marL="0" algn="l" defTabSz="1280160" rtl="0" eaLnBrk="1" latinLnBrk="0" hangingPunct="1">
+        <a:defRPr sz="2520" kern="1200">
           <a:solidFill>
             <a:schemeClr val="tx1"/>
           </a:solidFill>
@@ -2867,8 +2869,8 @@
           <a:cs typeface="+mn-cs"/>
         </a:defRPr>
       </a:lvl1pPr>
-      <a:lvl2pPr marL="457200" algn="l" defTabSz="914400" rtl="0" eaLnBrk="1" latinLnBrk="0" hangingPunct="1">
-        <a:defRPr sz="1800" kern="1200">
+      <a:lvl2pPr marL="640080" algn="l" defTabSz="1280160" rtl="0" eaLnBrk="1" latinLnBrk="0" hangingPunct="1">
+        <a:defRPr sz="2520" kern="1200">
           <a:solidFill>
             <a:schemeClr val="tx1"/>
           </a:solidFill>
@@ -2877,8 +2879,8 @@
           <a:cs typeface="+mn-cs"/>
         </a:defRPr>
       </a:lvl2pPr>
-      <a:lvl3pPr marL="914400" algn="l" defTabSz="914400" rtl="0" eaLnBrk="1" latinLnBrk="0" hangingPunct="1">
-        <a:defRPr sz="1800" kern="1200">
+      <a:lvl3pPr marL="1280160" algn="l" defTabSz="1280160" rtl="0" eaLnBrk="1" latinLnBrk="0" hangingPunct="1">
+        <a:defRPr sz="2520" kern="1200">
           <a:solidFill>
             <a:schemeClr val="tx1"/>
           </a:solidFill>
@@ -2887,8 +2889,8 @@
           <a:cs typeface="+mn-cs"/>
         </a:defRPr>
       </a:lvl3pPr>
-      <a:lvl4pPr marL="1371600" algn="l" defTabSz="914400" rtl="0" eaLnBrk="1" latinLnBrk="0" hangingPunct="1">
-        <a:defRPr sz="1800" kern="1200">
+      <a:lvl4pPr marL="1920240" algn="l" defTabSz="1280160" rtl="0" eaLnBrk="1" latinLnBrk="0" hangingPunct="1">
+        <a:defRPr sz="2520" kern="1200">
           <a:solidFill>
             <a:schemeClr val="tx1"/>
           </a:solidFill>
@@ -2897,8 +2899,8 @@
           <a:cs typeface="+mn-cs"/>
         </a:defRPr>
       </a:lvl4pPr>
-      <a:lvl5pPr marL="1828800" algn="l" defTabSz="914400" rtl="0" eaLnBrk="1" latinLnBrk="0" hangingPunct="1">
-        <a:defRPr sz="1800" kern="1200">
+      <a:lvl5pPr marL="2560320" algn="l" defTabSz="1280160" rtl="0" eaLnBrk="1" latinLnBrk="0" hangingPunct="1">
+        <a:defRPr sz="2520" kern="1200">
           <a:solidFill>
             <a:schemeClr val="tx1"/>
           </a:solidFill>
@@ -2907,8 +2909,8 @@
           <a:cs typeface="+mn-cs"/>
         </a:defRPr>
       </a:lvl5pPr>
-      <a:lvl6pPr marL="2286000" algn="l" defTabSz="914400" rtl="0" eaLnBrk="1" latinLnBrk="0" hangingPunct="1">
-        <a:defRPr sz="1800" kern="1200">
+      <a:lvl6pPr marL="3200400" algn="l" defTabSz="1280160" rtl="0" eaLnBrk="1" latinLnBrk="0" hangingPunct="1">
+        <a:defRPr sz="2520" kern="1200">
           <a:solidFill>
             <a:schemeClr val="tx1"/>
           </a:solidFill>
@@ -2917,8 +2919,8 @@
           <a:cs typeface="+mn-cs"/>
         </a:defRPr>
       </a:lvl6pPr>
-      <a:lvl7pPr marL="2743200" algn="l" defTabSz="914400" rtl="0" eaLnBrk="1" latinLnBrk="0" hangingPunct="1">
-        <a:defRPr sz="1800" kern="1200">
+      <a:lvl7pPr marL="3840480" algn="l" defTabSz="1280160" rtl="0" eaLnBrk="1" latinLnBrk="0" hangingPunct="1">
+        <a:defRPr sz="2520" kern="1200">
           <a:solidFill>
             <a:schemeClr val="tx1"/>
           </a:solidFill>
@@ -2927,8 +2929,8 @@
           <a:cs typeface="+mn-cs"/>
         </a:defRPr>
       </a:lvl7pPr>
-      <a:lvl8pPr marL="3200400" algn="l" defTabSz="914400" rtl="0" eaLnBrk="1" latinLnBrk="0" hangingPunct="1">
-        <a:defRPr sz="1800" kern="1200">
+      <a:lvl8pPr marL="4480560" algn="l" defTabSz="1280160" rtl="0" eaLnBrk="1" latinLnBrk="0" hangingPunct="1">
+        <a:defRPr sz="2520" kern="1200">
           <a:solidFill>
             <a:schemeClr val="tx1"/>
           </a:solidFill>
@@ -2937,8 +2939,8 @@
           <a:cs typeface="+mn-cs"/>
         </a:defRPr>
       </a:lvl8pPr>
-      <a:lvl9pPr marL="3657600" algn="l" defTabSz="914400" rtl="0" eaLnBrk="1" latinLnBrk="0" hangingPunct="1">
-        <a:defRPr sz="1800" kern="1200">
+      <a:lvl9pPr marL="5120640" algn="l" defTabSz="1280160" rtl="0" eaLnBrk="1" latinLnBrk="0" hangingPunct="1">
+        <a:defRPr sz="2520" kern="1200">
           <a:solidFill>
             <a:schemeClr val="tx1"/>
           </a:solidFill>
@@ -2971,16 +2973,16 @@
       </p:grpSpPr>
       <p:grpSp>
         <p:nvGrpSpPr>
-          <p:cNvPr id="36" name="Group 35"/>
+          <p:cNvPr id="31" name="Group 30"/>
           <p:cNvGrpSpPr/>
           <p:nvPr/>
         </p:nvGrpSpPr>
         <p:grpSpPr>
           <a:xfrm>
-            <a:off x="1280160" y="1243232"/>
-            <a:ext cx="10433491" cy="4587157"/>
-            <a:chOff x="1280160" y="1243232"/>
-            <a:chExt cx="10433491" cy="4587157"/>
+            <a:off x="520177" y="158413"/>
+            <a:ext cx="11445993" cy="9241619"/>
+            <a:chOff x="520177" y="158413"/>
+            <a:chExt cx="11445993" cy="9241619"/>
           </a:xfrm>
         </p:grpSpPr>
         <p:sp>
@@ -2991,7 +2993,7 @@
           </p:nvSpPr>
           <p:spPr>
             <a:xfrm>
-              <a:off x="5138057" y="3187337"/>
+              <a:off x="5581448" y="3786728"/>
               <a:ext cx="1733006" cy="1062446"/>
             </a:xfrm>
             <a:prstGeom prst="ellipse">
@@ -3020,10 +3022,9 @@
             <a:p>
               <a:pPr algn="ctr"/>
               <a:r>
-                <a:rPr lang="en-AU" dirty="0" smtClean="0"/>
+                <a:rPr lang="en-AU" dirty="0"/>
                 <a:t>Benefit</a:t>
               </a:r>
-              <a:endParaRPr lang="en-AU" dirty="0"/>
             </a:p>
           </p:txBody>
         </p:sp>
@@ -3035,7 +3036,7 @@
           </p:nvSpPr>
           <p:spPr>
             <a:xfrm>
-              <a:off x="1280160" y="1907177"/>
+              <a:off x="3593406" y="158413"/>
               <a:ext cx="1367246" cy="783772"/>
             </a:xfrm>
             <a:prstGeom prst="rect">
@@ -3066,10 +3067,9 @@
             <a:p>
               <a:pPr algn="ctr"/>
               <a:r>
-                <a:rPr lang="en-AU" dirty="0" smtClean="0"/>
+                <a:rPr lang="en-AU" dirty="0"/>
                 <a:t>Amount Supply</a:t>
               </a:r>
-              <a:endParaRPr lang="en-AU" dirty="0"/>
             </a:p>
           </p:txBody>
         </p:sp>
@@ -3081,7 +3081,7 @@
           </p:nvSpPr>
           <p:spPr>
             <a:xfrm>
-              <a:off x="1288869" y="3992879"/>
+              <a:off x="2458580" y="7926632"/>
               <a:ext cx="1367246" cy="783772"/>
             </a:xfrm>
             <a:prstGeom prst="rect">
@@ -3112,10 +3112,9 @@
             <a:p>
               <a:pPr algn="ctr"/>
               <a:r>
-                <a:rPr lang="en-AU" dirty="0" smtClean="0"/>
+                <a:rPr lang="en-AU" dirty="0"/>
                 <a:t>Amount Demand</a:t>
               </a:r>
-              <a:endParaRPr lang="en-AU" dirty="0"/>
             </a:p>
           </p:txBody>
         </p:sp>
@@ -3127,7 +3126,7 @@
           </p:nvSpPr>
           <p:spPr>
             <a:xfrm>
-              <a:off x="8390708" y="1391193"/>
+              <a:off x="7972698" y="1903909"/>
               <a:ext cx="1367246" cy="783772"/>
             </a:xfrm>
             <a:prstGeom prst="rect">
@@ -3158,10 +3157,9 @@
             <a:p>
               <a:pPr algn="ctr"/>
               <a:r>
-                <a:rPr lang="en-AU" dirty="0" smtClean="0"/>
+                <a:rPr lang="en-AU" dirty="0"/>
                 <a:t>Number Supply Patches</a:t>
               </a:r>
-              <a:endParaRPr lang="en-AU" dirty="0"/>
             </a:p>
           </p:txBody>
         </p:sp>
@@ -3173,7 +3171,7 @@
           </p:nvSpPr>
           <p:spPr>
             <a:xfrm>
-              <a:off x="6004560" y="1293222"/>
+              <a:off x="5783052" y="1892613"/>
               <a:ext cx="1367246" cy="783772"/>
             </a:xfrm>
             <a:prstGeom prst="rect">
@@ -3204,10 +3202,9 @@
             <a:p>
               <a:pPr algn="ctr"/>
               <a:r>
-                <a:rPr lang="en-AU" dirty="0" smtClean="0"/>
+                <a:rPr lang="en-AU" dirty="0"/>
                 <a:t>Supply-supply Network Density</a:t>
               </a:r>
-              <a:endParaRPr lang="en-AU" dirty="0"/>
             </a:p>
           </p:txBody>
         </p:sp>
@@ -3219,7 +3216,7 @@
           </p:nvSpPr>
           <p:spPr>
             <a:xfrm>
-              <a:off x="3958046" y="1489165"/>
+              <a:off x="3593406" y="1915207"/>
               <a:ext cx="1367246" cy="783772"/>
             </a:xfrm>
             <a:prstGeom prst="rect">
@@ -3250,10 +3247,9 @@
             <a:p>
               <a:pPr algn="ctr"/>
               <a:r>
-                <a:rPr lang="en-AU" dirty="0" smtClean="0"/>
+                <a:rPr lang="en-AU" dirty="0"/>
                 <a:t>Supply-supply Network Centralisation</a:t>
               </a:r>
-              <a:endParaRPr lang="en-AU" dirty="0"/>
             </a:p>
           </p:txBody>
         </p:sp>
@@ -3265,7 +3261,7 @@
           </p:nvSpPr>
           <p:spPr>
             <a:xfrm>
-              <a:off x="7913603" y="3502875"/>
+              <a:off x="8432138" y="6171390"/>
               <a:ext cx="1367246" cy="783772"/>
             </a:xfrm>
             <a:prstGeom prst="rect">
@@ -3296,10 +3292,9 @@
             <a:p>
               <a:pPr algn="ctr"/>
               <a:r>
-                <a:rPr lang="en-AU" dirty="0" smtClean="0"/>
+                <a:rPr lang="en-AU" dirty="0"/>
                 <a:t>Number Demand Patches</a:t>
               </a:r>
-              <a:endParaRPr lang="en-AU" dirty="0"/>
             </a:p>
           </p:txBody>
         </p:sp>
@@ -3311,7 +3306,7 @@
           </p:nvSpPr>
           <p:spPr>
             <a:xfrm>
-              <a:off x="6617270" y="5037909"/>
+              <a:off x="6550588" y="6138880"/>
               <a:ext cx="1367246" cy="783772"/>
             </a:xfrm>
             <a:prstGeom prst="rect">
@@ -3342,10 +3337,9 @@
             <a:p>
               <a:pPr algn="ctr"/>
               <a:r>
-                <a:rPr lang="en-AU" dirty="0" smtClean="0"/>
+                <a:rPr lang="en-AU" dirty="0"/>
                 <a:t>Supply-demand Network Density</a:t>
               </a:r>
-              <a:endParaRPr lang="en-AU" dirty="0"/>
             </a:p>
           </p:txBody>
         </p:sp>
@@ -3357,7 +3351,7 @@
           </p:nvSpPr>
           <p:spPr>
             <a:xfrm>
-              <a:off x="4554583" y="5046617"/>
+              <a:off x="4664806" y="6164360"/>
               <a:ext cx="1367246" cy="783772"/>
             </a:xfrm>
             <a:prstGeom prst="rect">
@@ -3389,119 +3383,15 @@
               <a:pPr algn="ctr"/>
               <a:r>
                 <a:rPr lang="en-AU" dirty="0" smtClean="0"/>
-                <a:t>Supply-demand Network Centralisation</a:t>
-              </a:r>
-              <a:endParaRPr lang="en-AU" dirty="0"/>
+                <a:t>Supply Node </a:t>
+              </a:r>
+              <a:r>
+                <a:rPr lang="en-AU" dirty="0"/>
+                <a:t>Centralisation in Supply-demand Network</a:t>
+              </a:r>
             </a:p>
           </p:txBody>
         </p:sp>
-        <p:cxnSp>
-          <p:nvCxnSpPr>
-            <p:cNvPr id="15" name="Straight Arrow Connector 14"/>
-            <p:cNvCxnSpPr>
-              <a:stCxn id="6" idx="3"/>
-              <a:endCxn id="4" idx="2"/>
-            </p:cNvCxnSpPr>
-            <p:nvPr/>
-          </p:nvCxnSpPr>
-          <p:spPr>
-            <a:xfrm flipV="1">
-              <a:off x="2656115" y="3718560"/>
-              <a:ext cx="2481942" cy="666205"/>
-            </a:xfrm>
-            <a:prstGeom prst="straightConnector1">
-              <a:avLst/>
-            </a:prstGeom>
-            <a:ln>
-              <a:tailEnd type="triangle"/>
-            </a:ln>
-          </p:spPr>
-          <p:style>
-            <a:lnRef idx="1">
-              <a:schemeClr val="accent1"/>
-            </a:lnRef>
-            <a:fillRef idx="0">
-              <a:schemeClr val="accent1"/>
-            </a:fillRef>
-            <a:effectRef idx="0">
-              <a:schemeClr val="accent1"/>
-            </a:effectRef>
-            <a:fontRef idx="minor">
-              <a:schemeClr val="tx1"/>
-            </a:fontRef>
-          </p:style>
-        </p:cxnSp>
-        <p:cxnSp>
-          <p:nvCxnSpPr>
-            <p:cNvPr id="16" name="Straight Arrow Connector 15"/>
-            <p:cNvCxnSpPr>
-              <a:stCxn id="5" idx="3"/>
-              <a:endCxn id="4" idx="2"/>
-            </p:cNvCxnSpPr>
-            <p:nvPr/>
-          </p:nvCxnSpPr>
-          <p:spPr>
-            <a:xfrm>
-              <a:off x="2647406" y="2299063"/>
-              <a:ext cx="2490651" cy="1419497"/>
-            </a:xfrm>
-            <a:prstGeom prst="straightConnector1">
-              <a:avLst/>
-            </a:prstGeom>
-            <a:ln>
-              <a:tailEnd type="triangle"/>
-            </a:ln>
-          </p:spPr>
-          <p:style>
-            <a:lnRef idx="1">
-              <a:schemeClr val="accent1"/>
-            </a:lnRef>
-            <a:fillRef idx="0">
-              <a:schemeClr val="accent1"/>
-            </a:fillRef>
-            <a:effectRef idx="0">
-              <a:schemeClr val="accent1"/>
-            </a:effectRef>
-            <a:fontRef idx="minor">
-              <a:schemeClr val="tx1"/>
-            </a:fontRef>
-          </p:style>
-        </p:cxnSp>
-        <p:cxnSp>
-          <p:nvCxnSpPr>
-            <p:cNvPr id="19" name="Straight Arrow Connector 18"/>
-            <p:cNvCxnSpPr>
-              <a:stCxn id="6" idx="3"/>
-            </p:cNvCxnSpPr>
-            <p:nvPr/>
-          </p:nvCxnSpPr>
-          <p:spPr>
-            <a:xfrm flipV="1">
-              <a:off x="2656115" y="2934789"/>
-              <a:ext cx="1119051" cy="1449976"/>
-            </a:xfrm>
-            <a:prstGeom prst="straightConnector1">
-              <a:avLst/>
-            </a:prstGeom>
-            <a:ln>
-              <a:tailEnd type="triangle"/>
-            </a:ln>
-          </p:spPr>
-          <p:style>
-            <a:lnRef idx="1">
-              <a:schemeClr val="accent1"/>
-            </a:lnRef>
-            <a:fillRef idx="0">
-              <a:schemeClr val="accent1"/>
-            </a:fillRef>
-            <a:effectRef idx="0">
-              <a:schemeClr val="accent1"/>
-            </a:effectRef>
-            <a:fontRef idx="minor">
-              <a:schemeClr val="tx1"/>
-            </a:fontRef>
-          </p:style>
-        </p:cxnSp>
         <p:cxnSp>
           <p:nvCxnSpPr>
             <p:cNvPr id="23" name="Straight Arrow Connector 22"/>
@@ -3513,80 +3403,8 @@
           </p:nvCxnSpPr>
           <p:spPr>
             <a:xfrm flipH="1">
-              <a:off x="6617270" y="2174965"/>
-              <a:ext cx="2457061" cy="1167964"/>
-            </a:xfrm>
-            <a:prstGeom prst="straightConnector1">
-              <a:avLst/>
-            </a:prstGeom>
-            <a:ln>
-              <a:tailEnd type="triangle"/>
-            </a:ln>
-          </p:spPr>
-          <p:style>
-            <a:lnRef idx="1">
-              <a:schemeClr val="accent1"/>
-            </a:lnRef>
-            <a:fillRef idx="0">
-              <a:schemeClr val="accent1"/>
-            </a:fillRef>
-            <a:effectRef idx="0">
-              <a:schemeClr val="accent1"/>
-            </a:effectRef>
-            <a:fontRef idx="minor">
-              <a:schemeClr val="tx1"/>
-            </a:fontRef>
-          </p:style>
-        </p:cxnSp>
-        <p:cxnSp>
-          <p:nvCxnSpPr>
-            <p:cNvPr id="26" name="Straight Arrow Connector 25"/>
-            <p:cNvCxnSpPr>
-              <a:stCxn id="7" idx="1"/>
-              <a:endCxn id="8" idx="3"/>
-            </p:cNvCxnSpPr>
-            <p:nvPr/>
-          </p:nvCxnSpPr>
-          <p:spPr>
-            <a:xfrm flipH="1" flipV="1">
-              <a:off x="7371806" y="1685108"/>
-              <a:ext cx="1018902" cy="97971"/>
-            </a:xfrm>
-            <a:prstGeom prst="straightConnector1">
-              <a:avLst/>
-            </a:prstGeom>
-            <a:ln>
-              <a:tailEnd type="triangle"/>
-            </a:ln>
-          </p:spPr>
-          <p:style>
-            <a:lnRef idx="1">
-              <a:schemeClr val="accent1"/>
-            </a:lnRef>
-            <a:fillRef idx="0">
-              <a:schemeClr val="accent1"/>
-            </a:fillRef>
-            <a:effectRef idx="0">
-              <a:schemeClr val="accent1"/>
-            </a:effectRef>
-            <a:fontRef idx="minor">
-              <a:schemeClr val="tx1"/>
-            </a:fontRef>
-          </p:style>
-        </p:cxnSp>
-        <p:cxnSp>
-          <p:nvCxnSpPr>
-            <p:cNvPr id="29" name="Straight Arrow Connector 28"/>
-            <p:cNvCxnSpPr>
-              <a:stCxn id="8" idx="1"/>
-              <a:endCxn id="9" idx="3"/>
-            </p:cNvCxnSpPr>
-            <p:nvPr/>
-          </p:nvCxnSpPr>
-          <p:spPr>
-            <a:xfrm flipH="1">
-              <a:off x="5325292" y="1685108"/>
-              <a:ext cx="679268" cy="195943"/>
+              <a:off x="7060661" y="2687681"/>
+              <a:ext cx="1595660" cy="1254639"/>
             </a:xfrm>
             <a:prstGeom prst="straightConnector1">
               <a:avLst/>
@@ -3621,8 +3439,8 @@
           </p:nvCxnSpPr>
           <p:spPr>
             <a:xfrm flipH="1">
-              <a:off x="6004560" y="2076994"/>
-              <a:ext cx="683623" cy="1110343"/>
+              <a:off x="6447951" y="2676385"/>
+              <a:ext cx="18724" cy="1110343"/>
             </a:xfrm>
             <a:prstGeom prst="straightConnector1">
               <a:avLst/>
@@ -3657,8 +3475,8 @@
           </p:nvCxnSpPr>
           <p:spPr>
             <a:xfrm>
-              <a:off x="4641669" y="2272937"/>
-              <a:ext cx="750181" cy="1069992"/>
+              <a:off x="4277029" y="2698979"/>
+              <a:ext cx="1558212" cy="1243341"/>
             </a:xfrm>
             <a:prstGeom prst="straightConnector1">
               <a:avLst/>
@@ -3686,87 +3504,15 @@
           <p:nvCxnSpPr>
             <p:cNvPr id="38" name="Straight Arrow Connector 37"/>
             <p:cNvCxnSpPr>
-              <a:stCxn id="10" idx="1"/>
-              <a:endCxn id="4" idx="6"/>
+              <a:stCxn id="10" idx="0"/>
+              <a:endCxn id="4" idx="5"/>
             </p:cNvCxnSpPr>
             <p:nvPr/>
           </p:nvCxnSpPr>
           <p:spPr>
             <a:xfrm flipH="1" flipV="1">
-              <a:off x="6871063" y="3718560"/>
-              <a:ext cx="1042540" cy="176201"/>
-            </a:xfrm>
-            <a:prstGeom prst="straightConnector1">
-              <a:avLst/>
-            </a:prstGeom>
-            <a:ln>
-              <a:tailEnd type="triangle"/>
-            </a:ln>
-          </p:spPr>
-          <p:style>
-            <a:lnRef idx="1">
-              <a:schemeClr val="accent1"/>
-            </a:lnRef>
-            <a:fillRef idx="0">
-              <a:schemeClr val="accent1"/>
-            </a:fillRef>
-            <a:effectRef idx="0">
-              <a:schemeClr val="accent1"/>
-            </a:effectRef>
-            <a:fontRef idx="minor">
-              <a:schemeClr val="tx1"/>
-            </a:fontRef>
-          </p:style>
-        </p:cxnSp>
-        <p:cxnSp>
-          <p:nvCxnSpPr>
-            <p:cNvPr id="44" name="Straight Arrow Connector 43"/>
-            <p:cNvCxnSpPr>
-              <a:stCxn id="10" idx="2"/>
-              <a:endCxn id="11" idx="3"/>
-            </p:cNvCxnSpPr>
-            <p:nvPr/>
-          </p:nvCxnSpPr>
-          <p:spPr>
-            <a:xfrm flipH="1">
-              <a:off x="7984516" y="4286647"/>
-              <a:ext cx="612710" cy="1143148"/>
-            </a:xfrm>
-            <a:prstGeom prst="straightConnector1">
-              <a:avLst/>
-            </a:prstGeom>
-            <a:ln>
-              <a:tailEnd type="triangle"/>
-            </a:ln>
-          </p:spPr>
-          <p:style>
-            <a:lnRef idx="1">
-              <a:schemeClr val="accent1"/>
-            </a:lnRef>
-            <a:fillRef idx="0">
-              <a:schemeClr val="accent1"/>
-            </a:fillRef>
-            <a:effectRef idx="0">
-              <a:schemeClr val="accent1"/>
-            </a:effectRef>
-            <a:fontRef idx="minor">
-              <a:schemeClr val="tx1"/>
-            </a:fontRef>
-          </p:style>
-        </p:cxnSp>
-        <p:cxnSp>
-          <p:nvCxnSpPr>
-            <p:cNvPr id="47" name="Straight Arrow Connector 46"/>
-            <p:cNvCxnSpPr>
-              <a:stCxn id="11" idx="1"/>
-              <a:endCxn id="13" idx="3"/>
-            </p:cNvCxnSpPr>
-            <p:nvPr/>
-          </p:nvCxnSpPr>
-          <p:spPr>
-            <a:xfrm flipH="1">
-              <a:off x="5921829" y="5429795"/>
-              <a:ext cx="695441" cy="8708"/>
+              <a:off x="7060661" y="4693582"/>
+              <a:ext cx="2055100" cy="1477808"/>
             </a:xfrm>
             <a:prstGeom prst="straightConnector1">
               <a:avLst/>
@@ -3795,14 +3541,14 @@
             <p:cNvPr id="53" name="Straight Arrow Connector 52"/>
             <p:cNvCxnSpPr>
               <a:stCxn id="11" idx="0"/>
-              <a:endCxn id="4" idx="5"/>
+              <a:endCxn id="4" idx="4"/>
             </p:cNvCxnSpPr>
             <p:nvPr/>
           </p:nvCxnSpPr>
           <p:spPr>
             <a:xfrm flipH="1" flipV="1">
-              <a:off x="6617270" y="4094191"/>
-              <a:ext cx="683623" cy="943718"/>
+              <a:off x="6447951" y="4849174"/>
+              <a:ext cx="786260" cy="1289706"/>
             </a:xfrm>
             <a:prstGeom prst="straightConnector1">
               <a:avLst/>
@@ -3831,17 +3577,233 @@
             <p:cNvPr id="57" name="Straight Arrow Connector 56"/>
             <p:cNvCxnSpPr>
               <a:stCxn id="13" idx="0"/>
-              <a:endCxn id="4" idx="4"/>
+              <a:endCxn id="4" idx="3"/>
             </p:cNvCxnSpPr>
             <p:nvPr/>
           </p:nvCxnSpPr>
           <p:spPr>
             <a:xfrm flipV="1">
-              <a:off x="5238206" y="4249783"/>
-              <a:ext cx="766354" cy="796834"/>
+              <a:off x="5348429" y="4693582"/>
+              <a:ext cx="486812" cy="1470778"/>
             </a:xfrm>
             <a:prstGeom prst="straightConnector1">
               <a:avLst/>
+            </a:prstGeom>
+            <a:ln>
+              <a:tailEnd type="triangle"/>
+            </a:ln>
+          </p:spPr>
+          <p:style>
+            <a:lnRef idx="1">
+              <a:schemeClr val="accent1"/>
+            </a:lnRef>
+            <a:fillRef idx="0">
+              <a:schemeClr val="accent1"/>
+            </a:fillRef>
+            <a:effectRef idx="0">
+              <a:schemeClr val="accent1"/>
+            </a:effectRef>
+            <a:fontRef idx="minor">
+              <a:schemeClr val="tx1"/>
+            </a:fontRef>
+          </p:style>
+        </p:cxnSp>
+        <p:sp>
+          <p:nvSpPr>
+            <p:cNvPr id="61" name="Rectangle 60"/>
+            <p:cNvSpPr/>
+            <p:nvPr/>
+          </p:nvSpPr>
+          <p:spPr>
+            <a:xfrm>
+              <a:off x="2512616" y="6164360"/>
+              <a:ext cx="1367246" cy="783772"/>
+            </a:xfrm>
+            <a:prstGeom prst="rect">
+              <a:avLst/>
+            </a:prstGeom>
+          </p:spPr>
+          <p:style>
+            <a:lnRef idx="2">
+              <a:schemeClr val="accent2">
+                <a:shade val="50000"/>
+              </a:schemeClr>
+            </a:lnRef>
+            <a:fillRef idx="1">
+              <a:schemeClr val="accent2"/>
+            </a:fillRef>
+            <a:effectRef idx="0">
+              <a:schemeClr val="accent2"/>
+            </a:effectRef>
+            <a:fontRef idx="minor">
+              <a:schemeClr val="lt1"/>
+            </a:fontRef>
+          </p:style>
+          <p:txBody>
+            <a:bodyPr rtlCol="0" anchor="ctr">
+              <a:normAutofit fontScale="77500" lnSpcReduction="20000"/>
+            </a:bodyPr>
+            <a:lstStyle/>
+            <a:p>
+              <a:pPr algn="ctr"/>
+              <a:r>
+                <a:rPr lang="en-AU" dirty="0"/>
+                <a:t>Demand </a:t>
+              </a:r>
+              <a:r>
+                <a:rPr lang="en-AU" dirty="0" smtClean="0"/>
+                <a:t>Node Centralisation in Supply-demand Network</a:t>
+              </a:r>
+              <a:endParaRPr lang="en-AU" dirty="0"/>
+            </a:p>
+          </p:txBody>
+        </p:sp>
+        <p:cxnSp>
+          <p:nvCxnSpPr>
+            <p:cNvPr id="70" name="Straight Arrow Connector 69"/>
+            <p:cNvCxnSpPr>
+              <a:stCxn id="61" idx="0"/>
+              <a:endCxn id="4" idx="3"/>
+            </p:cNvCxnSpPr>
+            <p:nvPr/>
+          </p:nvCxnSpPr>
+          <p:spPr>
+            <a:xfrm flipV="1">
+              <a:off x="3196239" y="4693582"/>
+              <a:ext cx="2639002" cy="1470778"/>
+            </a:xfrm>
+            <a:prstGeom prst="straightConnector1">
+              <a:avLst/>
+            </a:prstGeom>
+            <a:ln>
+              <a:tailEnd type="triangle"/>
+            </a:ln>
+          </p:spPr>
+          <p:style>
+            <a:lnRef idx="1">
+              <a:schemeClr val="accent1"/>
+            </a:lnRef>
+            <a:fillRef idx="0">
+              <a:schemeClr val="accent1"/>
+            </a:fillRef>
+            <a:effectRef idx="0">
+              <a:schemeClr val="accent1"/>
+            </a:effectRef>
+            <a:fontRef idx="minor">
+              <a:schemeClr val="tx1"/>
+            </a:fontRef>
+          </p:style>
+        </p:cxnSp>
+        <p:sp>
+          <p:nvSpPr>
+            <p:cNvPr id="96" name="Rectangle 95"/>
+            <p:cNvSpPr/>
+            <p:nvPr/>
+          </p:nvSpPr>
+          <p:spPr>
+            <a:xfrm>
+              <a:off x="7764470" y="199952"/>
+              <a:ext cx="1783702" cy="783772"/>
+            </a:xfrm>
+            <a:prstGeom prst="rect">
+              <a:avLst/>
+            </a:prstGeom>
+          </p:spPr>
+          <p:style>
+            <a:lnRef idx="2">
+              <a:schemeClr val="accent6">
+                <a:shade val="50000"/>
+              </a:schemeClr>
+            </a:lnRef>
+            <a:fillRef idx="1">
+              <a:schemeClr val="accent6"/>
+            </a:fillRef>
+            <a:effectRef idx="0">
+              <a:schemeClr val="accent6"/>
+            </a:effectRef>
+            <a:fontRef idx="minor">
+              <a:schemeClr val="lt1"/>
+            </a:fontRef>
+          </p:style>
+          <p:txBody>
+            <a:bodyPr rtlCol="0" anchor="ctr">
+              <a:normAutofit/>
+            </a:bodyPr>
+            <a:lstStyle/>
+            <a:p>
+              <a:pPr algn="ctr"/>
+              <a:r>
+                <a:rPr lang="en-AU" dirty="0" smtClean="0"/>
+                <a:t>Fragmentation Supply</a:t>
+              </a:r>
+              <a:endParaRPr lang="en-AU" dirty="0"/>
+            </a:p>
+          </p:txBody>
+        </p:sp>
+        <p:sp>
+          <p:nvSpPr>
+            <p:cNvPr id="97" name="Rectangle 96"/>
+            <p:cNvSpPr/>
+            <p:nvPr/>
+          </p:nvSpPr>
+          <p:spPr>
+            <a:xfrm>
+              <a:off x="8223910" y="7930410"/>
+              <a:ext cx="1783702" cy="783772"/>
+            </a:xfrm>
+            <a:prstGeom prst="rect">
+              <a:avLst/>
+            </a:prstGeom>
+          </p:spPr>
+          <p:style>
+            <a:lnRef idx="2">
+              <a:schemeClr val="accent6">
+                <a:shade val="50000"/>
+              </a:schemeClr>
+            </a:lnRef>
+            <a:fillRef idx="1">
+              <a:schemeClr val="accent6"/>
+            </a:fillRef>
+            <a:effectRef idx="0">
+              <a:schemeClr val="accent6"/>
+            </a:effectRef>
+            <a:fontRef idx="minor">
+              <a:schemeClr val="lt1"/>
+            </a:fontRef>
+          </p:style>
+          <p:txBody>
+            <a:bodyPr rtlCol="0" anchor="ctr">
+              <a:normAutofit/>
+            </a:bodyPr>
+            <a:lstStyle/>
+            <a:p>
+              <a:pPr algn="ctr"/>
+              <a:r>
+                <a:rPr lang="en-AU" dirty="0" smtClean="0"/>
+                <a:t>Fragmentation Demand</a:t>
+              </a:r>
+              <a:endParaRPr lang="en-AU" dirty="0"/>
+            </a:p>
+          </p:txBody>
+        </p:sp>
+        <p:cxnSp>
+          <p:nvCxnSpPr>
+            <p:cNvPr id="112" name="Curved Connector 111"/>
+            <p:cNvCxnSpPr>
+              <a:stCxn id="10" idx="2"/>
+              <a:endCxn id="11" idx="2"/>
+            </p:cNvCxnSpPr>
+            <p:nvPr/>
+          </p:nvCxnSpPr>
+          <p:spPr>
+            <a:xfrm rot="5400000" flipH="1">
+              <a:off x="8158731" y="5998132"/>
+              <a:ext cx="32510" cy="1881550"/>
+            </a:xfrm>
+            <a:prstGeom prst="curvedConnector3">
+              <a:avLst>
+                <a:gd name="adj1" fmla="val -703168"/>
+              </a:avLst>
             </a:prstGeom>
             <a:ln>
               <a:tailEnd type="triangle"/>
@@ -3864,21 +3826,21 @@
         </p:cxnSp>
         <p:cxnSp>
           <p:nvCxnSpPr>
-            <p:cNvPr id="69" name="Curved Connector 68"/>
+            <p:cNvPr id="115" name="Curved Connector 114"/>
             <p:cNvCxnSpPr>
-              <a:stCxn id="7" idx="3"/>
-              <a:endCxn id="11" idx="3"/>
+              <a:stCxn id="11" idx="2"/>
+              <a:endCxn id="13" idx="2"/>
             </p:cNvCxnSpPr>
             <p:nvPr/>
           </p:nvCxnSpPr>
           <p:spPr>
-            <a:xfrm flipH="1">
-              <a:off x="7984516" y="1783079"/>
-              <a:ext cx="1773438" cy="3646716"/>
+            <a:xfrm rot="5400000">
+              <a:off x="6278580" y="5992501"/>
+              <a:ext cx="25480" cy="1885782"/>
             </a:xfrm>
             <a:prstGeom prst="curvedConnector3">
               <a:avLst>
-                <a:gd name="adj1" fmla="val -87530"/>
+                <a:gd name="adj1" fmla="val 997174"/>
               </a:avLst>
             </a:prstGeom>
             <a:ln>
@@ -3902,21 +3864,617 @@
         </p:cxnSp>
         <p:cxnSp>
           <p:nvCxnSpPr>
-            <p:cNvPr id="33" name="Curved Connector 32"/>
+            <p:cNvPr id="124" name="Curved Connector 123"/>
+            <p:cNvCxnSpPr>
+              <a:stCxn id="11" idx="2"/>
+              <a:endCxn id="61" idx="2"/>
+            </p:cNvCxnSpPr>
+            <p:nvPr/>
+          </p:nvCxnSpPr>
+          <p:spPr>
+            <a:xfrm rot="5400000">
+              <a:off x="5202485" y="4916406"/>
+              <a:ext cx="25480" cy="4037972"/>
+            </a:xfrm>
+            <a:prstGeom prst="curvedConnector3">
+              <a:avLst>
+                <a:gd name="adj1" fmla="val 2097708"/>
+              </a:avLst>
+            </a:prstGeom>
+            <a:ln>
+              <a:tailEnd type="triangle"/>
+            </a:ln>
+          </p:spPr>
+          <p:style>
+            <a:lnRef idx="1">
+              <a:schemeClr val="accent1"/>
+            </a:lnRef>
+            <a:fillRef idx="0">
+              <a:schemeClr val="accent1"/>
+            </a:fillRef>
+            <a:effectRef idx="0">
+              <a:schemeClr val="accent1"/>
+            </a:effectRef>
+            <a:fontRef idx="minor">
+              <a:schemeClr val="tx1"/>
+            </a:fontRef>
+          </p:style>
+        </p:cxnSp>
+        <p:cxnSp>
+          <p:nvCxnSpPr>
+            <p:cNvPr id="138" name="Curved Connector 137"/>
+            <p:cNvCxnSpPr>
+              <a:stCxn id="7" idx="0"/>
+              <a:endCxn id="8" idx="0"/>
+            </p:cNvCxnSpPr>
+            <p:nvPr/>
+          </p:nvCxnSpPr>
+          <p:spPr>
+            <a:xfrm rot="16200000" flipV="1">
+              <a:off x="7555850" y="803438"/>
+              <a:ext cx="11296" cy="2189646"/>
+            </a:xfrm>
+            <a:prstGeom prst="curvedConnector3">
+              <a:avLst>
+                <a:gd name="adj1" fmla="val 2123725"/>
+              </a:avLst>
+            </a:prstGeom>
+            <a:ln>
+              <a:tailEnd type="triangle"/>
+            </a:ln>
+          </p:spPr>
+          <p:style>
+            <a:lnRef idx="1">
+              <a:schemeClr val="accent1"/>
+            </a:lnRef>
+            <a:fillRef idx="0">
+              <a:schemeClr val="accent1"/>
+            </a:fillRef>
+            <a:effectRef idx="0">
+              <a:schemeClr val="accent1"/>
+            </a:effectRef>
+            <a:fontRef idx="minor">
+              <a:schemeClr val="tx1"/>
+            </a:fontRef>
+          </p:style>
+        </p:cxnSp>
+        <p:cxnSp>
+          <p:nvCxnSpPr>
+            <p:cNvPr id="144" name="Curved Connector 143"/>
+            <p:cNvCxnSpPr>
+              <a:stCxn id="8" idx="0"/>
+              <a:endCxn id="9" idx="0"/>
+            </p:cNvCxnSpPr>
+            <p:nvPr/>
+          </p:nvCxnSpPr>
+          <p:spPr>
+            <a:xfrm rot="16200000" flipH="1" flipV="1">
+              <a:off x="5360555" y="809087"/>
+              <a:ext cx="22594" cy="2189646"/>
+            </a:xfrm>
+            <a:prstGeom prst="curvedConnector3">
+              <a:avLst>
+                <a:gd name="adj1" fmla="val -1011773"/>
+              </a:avLst>
+            </a:prstGeom>
+            <a:ln>
+              <a:tailEnd type="triangle"/>
+            </a:ln>
+          </p:spPr>
+          <p:style>
+            <a:lnRef idx="1">
+              <a:schemeClr val="accent1"/>
+            </a:lnRef>
+            <a:fillRef idx="0">
+              <a:schemeClr val="accent1"/>
+            </a:fillRef>
+            <a:effectRef idx="0">
+              <a:schemeClr val="accent1"/>
+            </a:effectRef>
+            <a:fontRef idx="minor">
+              <a:schemeClr val="tx1"/>
+            </a:fontRef>
+          </p:style>
+        </p:cxnSp>
+        <p:cxnSp>
+          <p:nvCxnSpPr>
+            <p:cNvPr id="202" name="Straight Arrow Connector 201"/>
+            <p:cNvCxnSpPr>
+              <a:stCxn id="61" idx="3"/>
+              <a:endCxn id="13" idx="1"/>
+            </p:cNvCxnSpPr>
+            <p:nvPr/>
+          </p:nvCxnSpPr>
+          <p:spPr>
+            <a:xfrm>
+              <a:off x="3879862" y="6556246"/>
+              <a:ext cx="784944" cy="0"/>
+            </a:xfrm>
+            <a:prstGeom prst="straightConnector1">
+              <a:avLst/>
+            </a:prstGeom>
+            <a:ln>
+              <a:prstDash val="dash"/>
+              <a:headEnd type="triangle" w="med" len="med"/>
+              <a:tailEnd type="triangle" w="med" len="med"/>
+            </a:ln>
+          </p:spPr>
+          <p:style>
+            <a:lnRef idx="1">
+              <a:schemeClr val="accent1"/>
+            </a:lnRef>
+            <a:fillRef idx="0">
+              <a:schemeClr val="accent1"/>
+            </a:fillRef>
+            <a:effectRef idx="0">
+              <a:schemeClr val="accent1"/>
+            </a:effectRef>
+            <a:fontRef idx="minor">
+              <a:schemeClr val="tx1"/>
+            </a:fontRef>
+          </p:style>
+        </p:cxnSp>
+        <p:cxnSp>
+          <p:nvCxnSpPr>
+            <p:cNvPr id="233" name="Curved Connector 232"/>
+            <p:cNvCxnSpPr>
+              <a:stCxn id="6" idx="1"/>
+              <a:endCxn id="4" idx="2"/>
+            </p:cNvCxnSpPr>
+            <p:nvPr/>
+          </p:nvCxnSpPr>
+          <p:spPr>
+            <a:xfrm rot="10800000" flipH="1">
+              <a:off x="2458580" y="4317952"/>
+              <a:ext cx="3122868" cy="4000567"/>
+            </a:xfrm>
+            <a:prstGeom prst="curvedConnector3">
+              <a:avLst>
+                <a:gd name="adj1" fmla="val -7320"/>
+              </a:avLst>
+            </a:prstGeom>
+            <a:ln>
+              <a:tailEnd type="triangle"/>
+            </a:ln>
+          </p:spPr>
+          <p:style>
+            <a:lnRef idx="1">
+              <a:schemeClr val="accent1"/>
+            </a:lnRef>
+            <a:fillRef idx="0">
+              <a:schemeClr val="accent1"/>
+            </a:fillRef>
+            <a:effectRef idx="0">
+              <a:schemeClr val="accent1"/>
+            </a:effectRef>
+            <a:fontRef idx="minor">
+              <a:schemeClr val="tx1"/>
+            </a:fontRef>
+          </p:style>
+        </p:cxnSp>
+        <p:cxnSp>
+          <p:nvCxnSpPr>
+            <p:cNvPr id="236" name="Curved Connector 235"/>
+            <p:cNvCxnSpPr>
+              <a:stCxn id="5" idx="1"/>
+              <a:endCxn id="4" idx="2"/>
+            </p:cNvCxnSpPr>
+            <p:nvPr/>
+          </p:nvCxnSpPr>
+          <p:spPr>
+            <a:xfrm rot="10800000" flipH="1" flipV="1">
+              <a:off x="3593406" y="550299"/>
+              <a:ext cx="1988042" cy="3767652"/>
+            </a:xfrm>
+            <a:prstGeom prst="curvedConnector3">
+              <a:avLst>
+                <a:gd name="adj1" fmla="val -11499"/>
+              </a:avLst>
+            </a:prstGeom>
+            <a:ln>
+              <a:tailEnd type="triangle"/>
+            </a:ln>
+          </p:spPr>
+          <p:style>
+            <a:lnRef idx="1">
+              <a:schemeClr val="accent1"/>
+            </a:lnRef>
+            <a:fillRef idx="0">
+              <a:schemeClr val="accent1"/>
+            </a:fillRef>
+            <a:effectRef idx="0">
+              <a:schemeClr val="accent1"/>
+            </a:effectRef>
+            <a:fontRef idx="minor">
+              <a:schemeClr val="tx1"/>
+            </a:fontRef>
+          </p:style>
+        </p:cxnSp>
+        <p:cxnSp>
+          <p:nvCxnSpPr>
+            <p:cNvPr id="239" name="Curved Connector 238"/>
+            <p:cNvCxnSpPr>
+              <a:stCxn id="6" idx="1"/>
+            </p:cNvCxnSpPr>
+            <p:nvPr/>
+          </p:nvCxnSpPr>
+          <p:spPr>
+            <a:xfrm rot="10800000" flipH="1">
+              <a:off x="2458580" y="3328416"/>
+              <a:ext cx="1129176" cy="4990102"/>
+            </a:xfrm>
+            <a:prstGeom prst="curvedConnector4">
+              <a:avLst>
+                <a:gd name="adj1" fmla="val -54796"/>
+                <a:gd name="adj2" fmla="val 100104"/>
+              </a:avLst>
+            </a:prstGeom>
+            <a:ln>
+              <a:tailEnd type="triangle"/>
+            </a:ln>
+          </p:spPr>
+          <p:style>
+            <a:lnRef idx="1">
+              <a:schemeClr val="accent1"/>
+            </a:lnRef>
+            <a:fillRef idx="0">
+              <a:schemeClr val="accent1"/>
+            </a:fillRef>
+            <a:effectRef idx="0">
+              <a:schemeClr val="accent1"/>
+            </a:effectRef>
+            <a:fontRef idx="minor">
+              <a:schemeClr val="tx1"/>
+            </a:fontRef>
+          </p:style>
+        </p:cxnSp>
+        <p:cxnSp>
+          <p:nvCxnSpPr>
+            <p:cNvPr id="271" name="Curved Connector 270"/>
             <p:cNvCxnSpPr>
               <a:stCxn id="7" idx="3"/>
+              <a:endCxn id="11" idx="0"/>
             </p:cNvCxnSpPr>
             <p:nvPr/>
           </p:nvCxnSpPr>
           <p:spPr>
             <a:xfrm flipH="1">
-              <a:off x="8414346" y="1783079"/>
-              <a:ext cx="1343608" cy="2928258"/>
+              <a:off x="7234211" y="2295795"/>
+              <a:ext cx="2105733" cy="3843085"/>
             </a:xfrm>
             <a:prstGeom prst="curvedConnector4">
               <a:avLst>
-                <a:gd name="adj1" fmla="val -17014"/>
-                <a:gd name="adj2" fmla="val 107546"/>
+                <a:gd name="adj1" fmla="val -23015"/>
+                <a:gd name="adj2" fmla="val 78575"/>
+              </a:avLst>
+            </a:prstGeom>
+            <a:ln>
+              <a:tailEnd type="triangle"/>
+            </a:ln>
+          </p:spPr>
+          <p:style>
+            <a:lnRef idx="1">
+              <a:schemeClr val="accent1"/>
+            </a:lnRef>
+            <a:fillRef idx="0">
+              <a:schemeClr val="accent1"/>
+            </a:fillRef>
+            <a:effectRef idx="0">
+              <a:schemeClr val="accent1"/>
+            </a:effectRef>
+            <a:fontRef idx="minor">
+              <a:schemeClr val="tx1"/>
+            </a:fontRef>
+          </p:style>
+        </p:cxnSp>
+        <p:cxnSp>
+          <p:nvCxnSpPr>
+            <p:cNvPr id="279" name="Straight Arrow Connector 278"/>
+            <p:cNvCxnSpPr>
+              <a:stCxn id="10" idx="0"/>
+            </p:cNvCxnSpPr>
+            <p:nvPr/>
+          </p:nvCxnSpPr>
+          <p:spPr>
+            <a:xfrm flipV="1">
+              <a:off x="9115761" y="5145024"/>
+              <a:ext cx="0" cy="1026366"/>
+            </a:xfrm>
+            <a:prstGeom prst="straightConnector1">
+              <a:avLst/>
+            </a:prstGeom>
+            <a:ln>
+              <a:tailEnd type="triangle"/>
+            </a:ln>
+          </p:spPr>
+          <p:style>
+            <a:lnRef idx="1">
+              <a:schemeClr val="accent1"/>
+            </a:lnRef>
+            <a:fillRef idx="0">
+              <a:schemeClr val="accent1"/>
+            </a:fillRef>
+            <a:effectRef idx="0">
+              <a:schemeClr val="accent1"/>
+            </a:effectRef>
+            <a:fontRef idx="minor">
+              <a:schemeClr val="tx1"/>
+            </a:fontRef>
+          </p:style>
+        </p:cxnSp>
+        <p:cxnSp>
+          <p:nvCxnSpPr>
+            <p:cNvPr id="287" name="Straight Arrow Connector 286"/>
+            <p:cNvCxnSpPr>
+              <a:stCxn id="96" idx="2"/>
+              <a:endCxn id="7" idx="0"/>
+            </p:cNvCxnSpPr>
+            <p:nvPr/>
+          </p:nvCxnSpPr>
+          <p:spPr>
+            <a:xfrm>
+              <a:off x="8656321" y="983724"/>
+              <a:ext cx="0" cy="920185"/>
+            </a:xfrm>
+            <a:prstGeom prst="straightConnector1">
+              <a:avLst/>
+            </a:prstGeom>
+            <a:ln>
+              <a:tailEnd type="triangle"/>
+            </a:ln>
+          </p:spPr>
+          <p:style>
+            <a:lnRef idx="1">
+              <a:schemeClr val="accent1"/>
+            </a:lnRef>
+            <a:fillRef idx="0">
+              <a:schemeClr val="accent1"/>
+            </a:fillRef>
+            <a:effectRef idx="0">
+              <a:schemeClr val="accent1"/>
+            </a:effectRef>
+            <a:fontRef idx="minor">
+              <a:schemeClr val="tx1"/>
+            </a:fontRef>
+          </p:style>
+        </p:cxnSp>
+        <p:cxnSp>
+          <p:nvCxnSpPr>
+            <p:cNvPr id="291" name="Straight Arrow Connector 290"/>
+            <p:cNvCxnSpPr>
+              <a:stCxn id="97" idx="0"/>
+              <a:endCxn id="10" idx="2"/>
+            </p:cNvCxnSpPr>
+            <p:nvPr/>
+          </p:nvCxnSpPr>
+          <p:spPr>
+            <a:xfrm flipV="1">
+              <a:off x="9115761" y="6955162"/>
+              <a:ext cx="0" cy="975248"/>
+            </a:xfrm>
+            <a:prstGeom prst="straightConnector1">
+              <a:avLst/>
+            </a:prstGeom>
+            <a:ln>
+              <a:tailEnd type="triangle"/>
+            </a:ln>
+          </p:spPr>
+          <p:style>
+            <a:lnRef idx="1">
+              <a:schemeClr val="accent1"/>
+            </a:lnRef>
+            <a:fillRef idx="0">
+              <a:schemeClr val="accent1"/>
+            </a:fillRef>
+            <a:effectRef idx="0">
+              <a:schemeClr val="accent1"/>
+            </a:effectRef>
+            <a:fontRef idx="minor">
+              <a:schemeClr val="tx1"/>
+            </a:fontRef>
+          </p:style>
+        </p:cxnSp>
+        <p:cxnSp>
+          <p:nvCxnSpPr>
+            <p:cNvPr id="298" name="Curved Connector 297"/>
+            <p:cNvCxnSpPr>
+              <a:stCxn id="96" idx="1"/>
+              <a:endCxn id="8" idx="0"/>
+            </p:cNvCxnSpPr>
+            <p:nvPr/>
+          </p:nvCxnSpPr>
+          <p:spPr>
+            <a:xfrm rot="10800000" flipV="1">
+              <a:off x="6466676" y="591837"/>
+              <a:ext cx="1297795" cy="1300775"/>
+            </a:xfrm>
+            <a:prstGeom prst="curvedConnector2">
+              <a:avLst/>
+            </a:prstGeom>
+            <a:ln>
+              <a:tailEnd type="triangle"/>
+            </a:ln>
+          </p:spPr>
+          <p:style>
+            <a:lnRef idx="1">
+              <a:schemeClr val="accent1"/>
+            </a:lnRef>
+            <a:fillRef idx="0">
+              <a:schemeClr val="accent1"/>
+            </a:fillRef>
+            <a:effectRef idx="0">
+              <a:schemeClr val="accent1"/>
+            </a:effectRef>
+            <a:fontRef idx="minor">
+              <a:schemeClr val="tx1"/>
+            </a:fontRef>
+          </p:style>
+        </p:cxnSp>
+        <p:cxnSp>
+          <p:nvCxnSpPr>
+            <p:cNvPr id="301" name="Curved Connector 300"/>
+            <p:cNvCxnSpPr>
+              <a:stCxn id="97" idx="1"/>
+              <a:endCxn id="11" idx="2"/>
+            </p:cNvCxnSpPr>
+            <p:nvPr/>
+          </p:nvCxnSpPr>
+          <p:spPr>
+            <a:xfrm rot="10800000">
+              <a:off x="7234212" y="6922652"/>
+              <a:ext cx="989699" cy="1399644"/>
+            </a:xfrm>
+            <a:prstGeom prst="curvedConnector2">
+              <a:avLst/>
+            </a:prstGeom>
+            <a:ln>
+              <a:tailEnd type="triangle"/>
+            </a:ln>
+          </p:spPr>
+          <p:style>
+            <a:lnRef idx="1">
+              <a:schemeClr val="accent1"/>
+            </a:lnRef>
+            <a:fillRef idx="0">
+              <a:schemeClr val="accent1"/>
+            </a:fillRef>
+            <a:effectRef idx="0">
+              <a:schemeClr val="accent1"/>
+            </a:effectRef>
+            <a:fontRef idx="minor">
+              <a:schemeClr val="tx1"/>
+            </a:fontRef>
+          </p:style>
+        </p:cxnSp>
+        <p:cxnSp>
+          <p:nvCxnSpPr>
+            <p:cNvPr id="305" name="Curved Connector 304"/>
+            <p:cNvCxnSpPr>
+              <a:stCxn id="5" idx="3"/>
+              <a:endCxn id="8" idx="0"/>
+            </p:cNvCxnSpPr>
+            <p:nvPr/>
+          </p:nvCxnSpPr>
+          <p:spPr>
+            <a:xfrm>
+              <a:off x="4960652" y="550299"/>
+              <a:ext cx="1506023" cy="1342314"/>
+            </a:xfrm>
+            <a:prstGeom prst="curvedConnector2">
+              <a:avLst/>
+            </a:prstGeom>
+            <a:ln>
+              <a:tailEnd type="triangle"/>
+            </a:ln>
+          </p:spPr>
+          <p:style>
+            <a:lnRef idx="1">
+              <a:schemeClr val="accent1"/>
+            </a:lnRef>
+            <a:fillRef idx="0">
+              <a:schemeClr val="accent1"/>
+            </a:fillRef>
+            <a:effectRef idx="0">
+              <a:schemeClr val="accent1"/>
+            </a:effectRef>
+            <a:fontRef idx="minor">
+              <a:schemeClr val="tx1"/>
+            </a:fontRef>
+          </p:style>
+        </p:cxnSp>
+        <p:cxnSp>
+          <p:nvCxnSpPr>
+            <p:cNvPr id="317" name="Curved Connector 316"/>
+            <p:cNvCxnSpPr>
+              <a:stCxn id="6" idx="3"/>
+              <a:endCxn id="11" idx="2"/>
+            </p:cNvCxnSpPr>
+            <p:nvPr/>
+          </p:nvCxnSpPr>
+          <p:spPr>
+            <a:xfrm flipV="1">
+              <a:off x="3825826" y="6922652"/>
+              <a:ext cx="3408385" cy="1395866"/>
+            </a:xfrm>
+            <a:prstGeom prst="curvedConnector2">
+              <a:avLst/>
+            </a:prstGeom>
+            <a:ln>
+              <a:tailEnd type="triangle"/>
+            </a:ln>
+          </p:spPr>
+          <p:style>
+            <a:lnRef idx="1">
+              <a:schemeClr val="accent1"/>
+            </a:lnRef>
+            <a:fillRef idx="0">
+              <a:schemeClr val="accent1"/>
+            </a:fillRef>
+            <a:effectRef idx="0">
+              <a:schemeClr val="accent1"/>
+            </a:effectRef>
+            <a:fontRef idx="minor">
+              <a:schemeClr val="tx1"/>
+            </a:fontRef>
+          </p:style>
+        </p:cxnSp>
+        <p:cxnSp>
+          <p:nvCxnSpPr>
+            <p:cNvPr id="327" name="Curved Connector 326"/>
+            <p:cNvCxnSpPr>
+              <a:stCxn id="96" idx="3"/>
+              <a:endCxn id="11" idx="2"/>
+            </p:cNvCxnSpPr>
+            <p:nvPr/>
+          </p:nvCxnSpPr>
+          <p:spPr>
+            <a:xfrm flipH="1">
+              <a:off x="7234211" y="591838"/>
+              <a:ext cx="2313961" cy="6330814"/>
+            </a:xfrm>
+            <a:prstGeom prst="curvedConnector4">
+              <a:avLst>
+                <a:gd name="adj1" fmla="val -72579"/>
+                <a:gd name="adj2" fmla="val 139046"/>
+              </a:avLst>
+            </a:prstGeom>
+            <a:ln>
+              <a:tailEnd type="triangle"/>
+            </a:ln>
+          </p:spPr>
+          <p:style>
+            <a:lnRef idx="1">
+              <a:schemeClr val="accent1"/>
+            </a:lnRef>
+            <a:fillRef idx="0">
+              <a:schemeClr val="accent1"/>
+            </a:fillRef>
+            <a:effectRef idx="0">
+              <a:schemeClr val="accent1"/>
+            </a:effectRef>
+            <a:fontRef idx="minor">
+              <a:schemeClr val="tx1"/>
+            </a:fontRef>
+          </p:style>
+        </p:cxnSp>
+        <p:cxnSp>
+          <p:nvCxnSpPr>
+            <p:cNvPr id="337" name="Curved Connector 336"/>
+            <p:cNvCxnSpPr>
+              <a:stCxn id="5" idx="1"/>
+              <a:endCxn id="11" idx="2"/>
+            </p:cNvCxnSpPr>
+            <p:nvPr/>
+          </p:nvCxnSpPr>
+          <p:spPr>
+            <a:xfrm rot="10800000" flipH="1" flipV="1">
+              <a:off x="3593405" y="550298"/>
+              <a:ext cx="3640805" cy="6372353"/>
+            </a:xfrm>
+            <a:prstGeom prst="curvedConnector4">
+              <a:avLst>
+                <a:gd name="adj1" fmla="val -77607"/>
+                <a:gd name="adj2" fmla="val 140513"/>
               </a:avLst>
             </a:prstGeom>
             <a:ln>
@@ -3940,14 +4498,14 @@
         </p:cxnSp>
         <p:sp>
           <p:nvSpPr>
-            <p:cNvPr id="34" name="TextBox 33"/>
+            <p:cNvPr id="2" name="TextBox 1"/>
             <p:cNvSpPr txBox="1"/>
             <p:nvPr/>
           </p:nvSpPr>
           <p:spPr>
             <a:xfrm>
-              <a:off x="3162456" y="2218900"/>
-              <a:ext cx="426720" cy="369332"/>
+              <a:off x="2819115" y="2151405"/>
+              <a:ext cx="646176" cy="461665"/>
             </a:xfrm>
             <a:prstGeom prst="rect">
               <a:avLst/>
@@ -3962,14 +4520,48 @@
             <a:p>
               <a:pPr algn="ctr"/>
               <a:r>
-                <a:rPr lang="el-GR" dirty="0" smtClean="0"/>
+                <a:rPr lang="el-GR" sz="2400" dirty="0" smtClean="0"/>
                 <a:t>α</a:t>
               </a:r>
               <a:r>
-                <a:rPr lang="en-AU" baseline="-25000" dirty="0" smtClean="0"/>
+                <a:rPr lang="en-AU" sz="2400" baseline="-25000" dirty="0" smtClean="0"/>
                 <a:t>1</a:t>
               </a:r>
-              <a:endParaRPr lang="en-AU" baseline="-25000" dirty="0"/>
+              <a:endParaRPr lang="en-AU" sz="2400" baseline="-25000" dirty="0"/>
+            </a:p>
+          </p:txBody>
+        </p:sp>
+        <p:sp>
+          <p:nvSpPr>
+            <p:cNvPr id="42" name="TextBox 41"/>
+            <p:cNvSpPr txBox="1"/>
+            <p:nvPr/>
+          </p:nvSpPr>
+          <p:spPr>
+            <a:xfrm>
+              <a:off x="520177" y="2434125"/>
+              <a:ext cx="646176" cy="461665"/>
+            </a:xfrm>
+            <a:prstGeom prst="rect">
+              <a:avLst/>
+            </a:prstGeom>
+            <a:noFill/>
+          </p:spPr>
+          <p:txBody>
+            <a:bodyPr wrap="square" rtlCol="0">
+              <a:spAutoFit/>
+            </a:bodyPr>
+            <a:lstStyle/>
+            <a:p>
+              <a:pPr algn="ctr"/>
+              <a:r>
+                <a:rPr lang="el-GR" sz="2400" dirty="0" smtClean="0"/>
+                <a:t>γ</a:t>
+              </a:r>
+              <a:r>
+                <a:rPr lang="en-AU" sz="2400" baseline="-25000" dirty="0"/>
+                <a:t>1</a:t>
+              </a:r>
             </a:p>
           </p:txBody>
         </p:sp>
@@ -3981,8 +4573,8 @@
           </p:nvSpPr>
           <p:spPr>
             <a:xfrm>
-              <a:off x="3758371" y="4006725"/>
-              <a:ext cx="426720" cy="369332"/>
+              <a:off x="1461244" y="4087118"/>
+              <a:ext cx="646176" cy="461665"/>
             </a:xfrm>
             <a:prstGeom prst="rect">
               <a:avLst/>
@@ -3997,14 +4589,48 @@
             <a:p>
               <a:pPr algn="ctr"/>
               <a:r>
-                <a:rPr lang="el-GR" dirty="0" smtClean="0"/>
+                <a:rPr lang="el-GR" sz="2400" dirty="0" smtClean="0"/>
                 <a:t>α</a:t>
               </a:r>
               <a:r>
-                <a:rPr lang="en-AU" baseline="-25000" dirty="0"/>
+                <a:rPr lang="en-AU" sz="2400" baseline="-25000" dirty="0" smtClean="0"/>
+                <a:t>3</a:t>
+              </a:r>
+              <a:endParaRPr lang="en-AU" sz="2400" baseline="-25000" dirty="0"/>
+            </a:p>
+          </p:txBody>
+        </p:sp>
+        <p:sp>
+          <p:nvSpPr>
+            <p:cNvPr id="44" name="TextBox 43"/>
+            <p:cNvSpPr txBox="1"/>
+            <p:nvPr/>
+          </p:nvSpPr>
+          <p:spPr>
+            <a:xfrm>
+              <a:off x="2684985" y="4544469"/>
+              <a:ext cx="646176" cy="461665"/>
+            </a:xfrm>
+            <a:prstGeom prst="rect">
+              <a:avLst/>
+            </a:prstGeom>
+            <a:noFill/>
+          </p:spPr>
+          <p:txBody>
+            <a:bodyPr wrap="square" rtlCol="0">
+              <a:spAutoFit/>
+            </a:bodyPr>
+            <a:lstStyle/>
+            <a:p>
+              <a:pPr algn="ctr"/>
+              <a:r>
+                <a:rPr lang="el-GR" sz="2400" dirty="0" smtClean="0"/>
+                <a:t>α</a:t>
+              </a:r>
+              <a:r>
+                <a:rPr lang="en-AU" sz="2400" baseline="-25000" dirty="0"/>
                 <a:t>2</a:t>
               </a:r>
-              <a:endParaRPr lang="en-AU" baseline="-25000" dirty="0"/>
             </a:p>
           </p:txBody>
         </p:sp>
@@ -4016,8 +4642,8 @@
           </p:nvSpPr>
           <p:spPr>
             <a:xfrm>
-              <a:off x="2949096" y="3161413"/>
-              <a:ext cx="426720" cy="369332"/>
+              <a:off x="4380549" y="7782240"/>
+              <a:ext cx="646176" cy="461665"/>
             </a:xfrm>
             <a:prstGeom prst="rect">
               <a:avLst/>
@@ -4032,14 +4658,14 @@
             <a:p>
               <a:pPr algn="ctr"/>
               <a:r>
-                <a:rPr lang="el-GR" dirty="0" smtClean="0"/>
-                <a:t>α</a:t>
-              </a:r>
-              <a:r>
-                <a:rPr lang="en-AU" baseline="-25000" dirty="0" smtClean="0"/>
-                <a:t>3</a:t>
-              </a:r>
-              <a:endParaRPr lang="en-AU" baseline="-25000" dirty="0"/>
+                <a:rPr lang="el-GR" sz="2400" dirty="0" smtClean="0"/>
+                <a:t>γ</a:t>
+              </a:r>
+              <a:r>
+                <a:rPr lang="en-AU" sz="2400" baseline="-25000" dirty="0" smtClean="0"/>
+                <a:t>2</a:t>
+              </a:r>
+              <a:endParaRPr lang="en-AU" sz="2400" baseline="-25000" dirty="0"/>
             </a:p>
           </p:txBody>
         </p:sp>
@@ -4051,8 +4677,8 @@
           </p:nvSpPr>
           <p:spPr>
             <a:xfrm>
-              <a:off x="7652968" y="2304200"/>
-              <a:ext cx="426720" cy="369332"/>
+              <a:off x="7561996" y="7616688"/>
+              <a:ext cx="646176" cy="461665"/>
             </a:xfrm>
             <a:prstGeom prst="rect">
               <a:avLst/>
@@ -4067,14 +4693,49 @@
             <a:p>
               <a:pPr algn="ctr"/>
               <a:r>
-                <a:rPr lang="el-GR" dirty="0" smtClean="0"/>
-                <a:t>α</a:t>
-              </a:r>
-              <a:r>
-                <a:rPr lang="en-AU" baseline="-25000" dirty="0" smtClean="0"/>
+                <a:rPr lang="el-GR" sz="2400" dirty="0" smtClean="0"/>
+                <a:t>γ</a:t>
+              </a:r>
+              <a:r>
+                <a:rPr lang="en-AU" sz="2400" baseline="-25000" dirty="0"/>
                 <a:t>4</a:t>
               </a:r>
-              <a:endParaRPr lang="en-AU" baseline="-25000" dirty="0"/>
+              <a:endParaRPr lang="en-AU" sz="2400" baseline="-25000" dirty="0"/>
+            </a:p>
+          </p:txBody>
+        </p:sp>
+        <p:sp>
+          <p:nvSpPr>
+            <p:cNvPr id="47" name="TextBox 46"/>
+            <p:cNvSpPr txBox="1"/>
+            <p:nvPr/>
+          </p:nvSpPr>
+          <p:spPr>
+            <a:xfrm>
+              <a:off x="9089199" y="7179443"/>
+              <a:ext cx="646176" cy="461665"/>
+            </a:xfrm>
+            <a:prstGeom prst="rect">
+              <a:avLst/>
+            </a:prstGeom>
+            <a:noFill/>
+          </p:spPr>
+          <p:txBody>
+            <a:bodyPr wrap="square" rtlCol="0">
+              <a:spAutoFit/>
+            </a:bodyPr>
+            <a:lstStyle/>
+            <a:p>
+              <a:pPr algn="ctr"/>
+              <a:r>
+                <a:rPr lang="el-GR" sz="2400" dirty="0" smtClean="0"/>
+                <a:t>γ</a:t>
+              </a:r>
+              <a:r>
+                <a:rPr lang="en-AU" sz="2400" baseline="-25000" dirty="0"/>
+                <a:t>5</a:t>
+              </a:r>
+              <a:endParaRPr lang="en-AU" sz="2400" baseline="-25000" dirty="0"/>
             </a:p>
           </p:txBody>
         </p:sp>
@@ -4086,8 +4747,8 @@
           </p:nvSpPr>
           <p:spPr>
             <a:xfrm>
-              <a:off x="5975635" y="2278075"/>
-              <a:ext cx="426720" cy="369332"/>
+              <a:off x="11319994" y="4317950"/>
+              <a:ext cx="646176" cy="461665"/>
             </a:xfrm>
             <a:prstGeom prst="rect">
               <a:avLst/>
@@ -4102,14 +4763,14 @@
             <a:p>
               <a:pPr algn="ctr"/>
               <a:r>
-                <a:rPr lang="el-GR" dirty="0" smtClean="0"/>
-                <a:t>α</a:t>
-              </a:r>
-              <a:r>
-                <a:rPr lang="en-AU" baseline="-25000" dirty="0" smtClean="0"/>
-                <a:t>5</a:t>
-              </a:r>
-              <a:endParaRPr lang="en-AU" baseline="-25000" dirty="0"/>
+                <a:rPr lang="el-GR" sz="2400" dirty="0" smtClean="0"/>
+                <a:t>γ</a:t>
+              </a:r>
+              <a:r>
+                <a:rPr lang="en-AU" sz="2400" baseline="-25000" dirty="0"/>
+                <a:t>7</a:t>
+              </a:r>
+              <a:endParaRPr lang="en-AU" sz="2400" baseline="-25000" dirty="0"/>
             </a:p>
           </p:txBody>
         </p:sp>
@@ -4121,8 +4782,8 @@
           </p:nvSpPr>
           <p:spPr>
             <a:xfrm>
-              <a:off x="4948335" y="2468880"/>
-              <a:ext cx="426720" cy="369332"/>
+              <a:off x="8601456" y="1082868"/>
+              <a:ext cx="646176" cy="461665"/>
             </a:xfrm>
             <a:prstGeom prst="rect">
               <a:avLst/>
@@ -4137,14 +4798,14 @@
             <a:p>
               <a:pPr algn="ctr"/>
               <a:r>
-                <a:rPr lang="el-GR" dirty="0" smtClean="0"/>
-                <a:t>α</a:t>
-              </a:r>
-              <a:r>
-                <a:rPr lang="en-AU" baseline="-25000" dirty="0" smtClean="0"/>
-                <a:t>6</a:t>
-              </a:r>
-              <a:endParaRPr lang="en-AU" baseline="-25000" dirty="0"/>
+                <a:rPr lang="el-GR" sz="2400" dirty="0" smtClean="0"/>
+                <a:t>γ</a:t>
+              </a:r>
+              <a:r>
+                <a:rPr lang="en-AU" sz="2400" baseline="-25000" dirty="0"/>
+                <a:t>8</a:t>
+              </a:r>
+              <a:endParaRPr lang="en-AU" sz="2400" baseline="-25000" dirty="0"/>
             </a:p>
           </p:txBody>
         </p:sp>
@@ -4156,8 +4817,8 @@
           </p:nvSpPr>
           <p:spPr>
             <a:xfrm>
-              <a:off x="7226248" y="3421771"/>
-              <a:ext cx="426720" cy="369332"/>
+              <a:off x="6713640" y="294383"/>
+              <a:ext cx="646176" cy="461665"/>
             </a:xfrm>
             <a:prstGeom prst="rect">
               <a:avLst/>
@@ -4172,14 +4833,14 @@
             <a:p>
               <a:pPr algn="ctr"/>
               <a:r>
-                <a:rPr lang="el-GR" dirty="0" smtClean="0"/>
-                <a:t>α</a:t>
-              </a:r>
-              <a:r>
-                <a:rPr lang="en-AU" baseline="-25000" dirty="0" smtClean="0"/>
-                <a:t>7</a:t>
-              </a:r>
-              <a:endParaRPr lang="en-AU" baseline="-25000" dirty="0"/>
+                <a:rPr lang="el-GR" sz="2400" dirty="0" smtClean="0"/>
+                <a:t>γ</a:t>
+              </a:r>
+              <a:r>
+                <a:rPr lang="en-AU" sz="2400" baseline="-25000" dirty="0"/>
+                <a:t>9</a:t>
+              </a:r>
+              <a:endParaRPr lang="en-AU" sz="2400" baseline="-25000" dirty="0"/>
             </a:p>
           </p:txBody>
         </p:sp>
@@ -4191,8 +4852,8 @@
           </p:nvSpPr>
           <p:spPr>
             <a:xfrm>
-              <a:off x="6941976" y="4212465"/>
-              <a:ext cx="426720" cy="369332"/>
+              <a:off x="4991583" y="2896499"/>
+              <a:ext cx="646176" cy="461665"/>
             </a:xfrm>
             <a:prstGeom prst="rect">
               <a:avLst/>
@@ -4207,14 +4868,14 @@
             <a:p>
               <a:pPr algn="ctr"/>
               <a:r>
-                <a:rPr lang="el-GR" dirty="0" smtClean="0"/>
-                <a:t>α</a:t>
-              </a:r>
-              <a:r>
-                <a:rPr lang="en-AU" baseline="-25000" dirty="0" smtClean="0"/>
-                <a:t>8</a:t>
-              </a:r>
-              <a:endParaRPr lang="en-AU" baseline="-25000" dirty="0"/>
+                <a:rPr lang="el-GR" sz="2400" dirty="0"/>
+                <a:t>β</a:t>
+              </a:r>
+              <a:r>
+                <a:rPr lang="en-AU" sz="2400" baseline="-25000" dirty="0" smtClean="0"/>
+                <a:t>1</a:t>
+              </a:r>
+              <a:endParaRPr lang="en-AU" sz="2400" baseline="-25000" dirty="0"/>
             </a:p>
           </p:txBody>
         </p:sp>
@@ -4226,8 +4887,8 @@
           </p:nvSpPr>
           <p:spPr>
             <a:xfrm>
-              <a:off x="5677989" y="4457003"/>
-              <a:ext cx="426720" cy="369332"/>
+              <a:off x="6471730" y="2890486"/>
+              <a:ext cx="646176" cy="461665"/>
             </a:xfrm>
             <a:prstGeom prst="rect">
               <a:avLst/>
@@ -4242,12 +4903,12 @@
             <a:p>
               <a:pPr algn="ctr"/>
               <a:r>
-                <a:rPr lang="el-GR" dirty="0" smtClean="0"/>
-                <a:t>α</a:t>
-              </a:r>
-              <a:r>
-                <a:rPr lang="en-AU" baseline="-25000" dirty="0"/>
-                <a:t>9</a:t>
+                <a:rPr lang="el-GR" sz="2400" dirty="0" smtClean="0"/>
+                <a:t>β</a:t>
+              </a:r>
+              <a:r>
+                <a:rPr lang="en-AU" sz="2400" baseline="-25000" dirty="0"/>
+                <a:t>2</a:t>
               </a:r>
             </a:p>
           </p:txBody>
@@ -4260,8 +4921,8 @@
           </p:nvSpPr>
           <p:spPr>
             <a:xfrm>
-              <a:off x="11286931" y="2818005"/>
-              <a:ext cx="426720" cy="369332"/>
+              <a:off x="7916777" y="3275746"/>
+              <a:ext cx="646176" cy="461665"/>
             </a:xfrm>
             <a:prstGeom prst="rect">
               <a:avLst/>
@@ -4276,13 +4937,14 @@
             <a:p>
               <a:pPr algn="ctr"/>
               <a:r>
-                <a:rPr lang="el-GR" dirty="0" smtClean="0"/>
-                <a:t>γ</a:t>
-              </a:r>
-              <a:r>
-                <a:rPr lang="en-AU" baseline="-25000" dirty="0"/>
-                <a:t>1</a:t>
-              </a:r>
+                <a:rPr lang="el-GR" sz="2400" dirty="0" smtClean="0"/>
+                <a:t>β</a:t>
+              </a:r>
+              <a:r>
+                <a:rPr lang="en-AU" sz="2400" baseline="-25000" dirty="0" smtClean="0"/>
+                <a:t>3</a:t>
+              </a:r>
+              <a:endParaRPr lang="en-AU" sz="2400" baseline="-25000" dirty="0"/>
             </a:p>
           </p:txBody>
         </p:sp>
@@ -4294,8 +4956,8 @@
           </p:nvSpPr>
           <p:spPr>
             <a:xfrm>
-              <a:off x="7866328" y="4566050"/>
-              <a:ext cx="426720" cy="369332"/>
+              <a:off x="9786322" y="3786728"/>
+              <a:ext cx="646176" cy="461665"/>
             </a:xfrm>
             <a:prstGeom prst="rect">
               <a:avLst/>
@@ -4310,14 +4972,13 @@
             <a:p>
               <a:pPr algn="ctr"/>
               <a:r>
-                <a:rPr lang="el-GR" dirty="0" smtClean="0"/>
-                <a:t>γ</a:t>
-              </a:r>
-              <a:r>
-                <a:rPr lang="en-AU" baseline="-25000" dirty="0" smtClean="0"/>
-                <a:t>2</a:t>
-              </a:r>
-              <a:endParaRPr lang="en-AU" baseline="-25000" dirty="0"/>
+                <a:rPr lang="el-GR" sz="2400" dirty="0" smtClean="0"/>
+                <a:t>β</a:t>
+              </a:r>
+              <a:r>
+                <a:rPr lang="en-AU" sz="2400" baseline="-25000" dirty="0"/>
+                <a:t>4</a:t>
+              </a:r>
             </a:p>
           </p:txBody>
         </p:sp>
@@ -4329,8 +4990,8 @@
           </p:nvSpPr>
           <p:spPr>
             <a:xfrm>
-              <a:off x="10014857" y="3606437"/>
-              <a:ext cx="426720" cy="369332"/>
+              <a:off x="9082295" y="5361802"/>
+              <a:ext cx="646176" cy="461665"/>
             </a:xfrm>
             <a:prstGeom prst="rect">
               <a:avLst/>
@@ -4345,14 +5006,14 @@
             <a:p>
               <a:pPr algn="ctr"/>
               <a:r>
-                <a:rPr lang="el-GR" dirty="0" smtClean="0"/>
-                <a:t>γ</a:t>
-              </a:r>
-              <a:r>
-                <a:rPr lang="en-AU" baseline="-25000" dirty="0" smtClean="0"/>
-                <a:t>3</a:t>
-              </a:r>
-              <a:endParaRPr lang="en-AU" baseline="-25000" dirty="0"/>
+                <a:rPr lang="el-GR" sz="2400" dirty="0" smtClean="0"/>
+                <a:t>β</a:t>
+              </a:r>
+              <a:r>
+                <a:rPr lang="en-AU" sz="2400" baseline="-25000" dirty="0" smtClean="0"/>
+                <a:t>5</a:t>
+              </a:r>
+              <a:endParaRPr lang="en-AU" sz="2400" baseline="-25000" dirty="0"/>
             </a:p>
           </p:txBody>
         </p:sp>
@@ -4364,8 +5025,8 @@
           </p:nvSpPr>
           <p:spPr>
             <a:xfrm>
-              <a:off x="6057434" y="5428633"/>
-              <a:ext cx="426720" cy="369332"/>
+              <a:off x="7600779" y="4618341"/>
+              <a:ext cx="646176" cy="461665"/>
             </a:xfrm>
             <a:prstGeom prst="rect">
               <a:avLst/>
@@ -4380,14 +5041,14 @@
             <a:p>
               <a:pPr algn="ctr"/>
               <a:r>
-                <a:rPr lang="el-GR" dirty="0" smtClean="0"/>
-                <a:t>γ</a:t>
-              </a:r>
-              <a:r>
-                <a:rPr lang="en-AU" baseline="-25000" dirty="0" smtClean="0"/>
-                <a:t>4</a:t>
-              </a:r>
-              <a:endParaRPr lang="en-AU" baseline="-25000" dirty="0"/>
+                <a:rPr lang="el-GR" sz="2400" dirty="0" smtClean="0"/>
+                <a:t>β</a:t>
+              </a:r>
+              <a:r>
+                <a:rPr lang="en-AU" sz="2400" baseline="-25000" dirty="0" smtClean="0"/>
+                <a:t>6</a:t>
+              </a:r>
+              <a:endParaRPr lang="en-AU" sz="2400" baseline="-25000" dirty="0"/>
             </a:p>
           </p:txBody>
         </p:sp>
@@ -4399,8 +5060,8 @@
           </p:nvSpPr>
           <p:spPr>
             <a:xfrm>
-              <a:off x="7760892" y="1243232"/>
-              <a:ext cx="426720" cy="369332"/>
+              <a:off x="6631515" y="4982416"/>
+              <a:ext cx="646176" cy="461665"/>
             </a:xfrm>
             <a:prstGeom prst="rect">
               <a:avLst/>
@@ -4415,14 +5076,13 @@
             <a:p>
               <a:pPr algn="ctr"/>
               <a:r>
-                <a:rPr lang="el-GR" dirty="0"/>
+                <a:rPr lang="el-GR" sz="2400" dirty="0" smtClean="0"/>
                 <a:t>β</a:t>
               </a:r>
               <a:r>
-                <a:rPr lang="en-AU" baseline="-25000" dirty="0" smtClean="0"/>
-                <a:t>1</a:t>
-              </a:r>
-              <a:endParaRPr lang="en-AU" baseline="-25000" dirty="0"/>
+                <a:rPr lang="en-AU" sz="2400" baseline="-25000" dirty="0"/>
+                <a:t>7</a:t>
+              </a:r>
             </a:p>
           </p:txBody>
         </p:sp>
@@ -4434,8 +5094,8 @@
           </p:nvSpPr>
           <p:spPr>
             <a:xfrm>
-              <a:off x="5422641" y="1280160"/>
-              <a:ext cx="426720" cy="369332"/>
+              <a:off x="5533893" y="5321434"/>
+              <a:ext cx="646176" cy="461665"/>
             </a:xfrm>
             <a:prstGeom prst="rect">
               <a:avLst/>
@@ -4450,14 +5110,394 @@
             <a:p>
               <a:pPr algn="ctr"/>
               <a:r>
-                <a:rPr lang="el-GR" dirty="0" smtClean="0"/>
+                <a:rPr lang="el-GR" sz="2400" dirty="0" smtClean="0"/>
                 <a:t>β</a:t>
               </a:r>
               <a:r>
-                <a:rPr lang="en-AU" baseline="-25000" dirty="0"/>
+                <a:rPr lang="en-AU" sz="2400" baseline="-25000" dirty="0"/>
+                <a:t>8</a:t>
+              </a:r>
+            </a:p>
+          </p:txBody>
+        </p:sp>
+        <p:sp>
+          <p:nvSpPr>
+            <p:cNvPr id="62" name="TextBox 61"/>
+            <p:cNvSpPr txBox="1"/>
+            <p:nvPr/>
+          </p:nvSpPr>
+          <p:spPr>
+            <a:xfrm>
+              <a:off x="3941250" y="4967306"/>
+              <a:ext cx="646176" cy="461665"/>
+            </a:xfrm>
+            <a:prstGeom prst="rect">
+              <a:avLst/>
+            </a:prstGeom>
+            <a:noFill/>
+          </p:spPr>
+          <p:txBody>
+            <a:bodyPr wrap="square" rtlCol="0">
+              <a:spAutoFit/>
+            </a:bodyPr>
+            <a:lstStyle/>
+            <a:p>
+              <a:pPr algn="ctr"/>
+              <a:r>
+                <a:rPr lang="el-GR" sz="2400" dirty="0" smtClean="0"/>
+                <a:t>β</a:t>
+              </a:r>
+              <a:r>
+                <a:rPr lang="en-AU" sz="2400" baseline="-25000" dirty="0"/>
+                <a:t>9</a:t>
+              </a:r>
+            </a:p>
+          </p:txBody>
+        </p:sp>
+        <p:sp>
+          <p:nvSpPr>
+            <p:cNvPr id="63" name="TextBox 62"/>
+            <p:cNvSpPr txBox="1"/>
+            <p:nvPr/>
+          </p:nvSpPr>
+          <p:spPr>
+            <a:xfrm>
+              <a:off x="5644275" y="290833"/>
+              <a:ext cx="646176" cy="461665"/>
+            </a:xfrm>
+            <a:prstGeom prst="rect">
+              <a:avLst/>
+            </a:prstGeom>
+            <a:noFill/>
+          </p:spPr>
+          <p:txBody>
+            <a:bodyPr wrap="square" rtlCol="0">
+              <a:spAutoFit/>
+            </a:bodyPr>
+            <a:lstStyle/>
+            <a:p>
+              <a:pPr algn="ctr"/>
+              <a:r>
+                <a:rPr lang="el-GR" sz="2400" dirty="0" smtClean="0"/>
+                <a:t>γ</a:t>
+              </a:r>
+              <a:r>
+                <a:rPr lang="en-AU" sz="2400" baseline="-25000" dirty="0" smtClean="0"/>
+                <a:t>10</a:t>
+              </a:r>
+              <a:endParaRPr lang="en-AU" sz="2400" baseline="-25000" dirty="0"/>
+            </a:p>
+          </p:txBody>
+        </p:sp>
+        <p:sp>
+          <p:nvSpPr>
+            <p:cNvPr id="64" name="TextBox 63"/>
+            <p:cNvSpPr txBox="1"/>
+            <p:nvPr/>
+          </p:nvSpPr>
+          <p:spPr>
+            <a:xfrm>
+              <a:off x="7353425" y="1124671"/>
+              <a:ext cx="646176" cy="461665"/>
+            </a:xfrm>
+            <a:prstGeom prst="rect">
+              <a:avLst/>
+            </a:prstGeom>
+            <a:noFill/>
+          </p:spPr>
+          <p:txBody>
+            <a:bodyPr wrap="square" rtlCol="0">
+              <a:spAutoFit/>
+            </a:bodyPr>
+            <a:lstStyle/>
+            <a:p>
+              <a:pPr algn="ctr"/>
+              <a:r>
+                <a:rPr lang="el-GR" sz="2400" dirty="0" smtClean="0"/>
+                <a:t>η</a:t>
+              </a:r>
+              <a:r>
+                <a:rPr lang="en-AU" sz="2400" baseline="-25000" dirty="0"/>
+                <a:t>1</a:t>
+              </a:r>
+            </a:p>
+          </p:txBody>
+        </p:sp>
+        <p:sp>
+          <p:nvSpPr>
+            <p:cNvPr id="65" name="TextBox 64"/>
+            <p:cNvSpPr txBox="1"/>
+            <p:nvPr/>
+          </p:nvSpPr>
+          <p:spPr>
+            <a:xfrm>
+              <a:off x="5044035" y="1178710"/>
+              <a:ext cx="646176" cy="461665"/>
+            </a:xfrm>
+            <a:prstGeom prst="rect">
+              <a:avLst/>
+            </a:prstGeom>
+            <a:noFill/>
+          </p:spPr>
+          <p:txBody>
+            <a:bodyPr wrap="square" rtlCol="0">
+              <a:spAutoFit/>
+            </a:bodyPr>
+            <a:lstStyle/>
+            <a:p>
+              <a:pPr algn="ctr"/>
+              <a:r>
+                <a:rPr lang="el-GR" sz="2400" dirty="0" smtClean="0"/>
+                <a:t>η</a:t>
+              </a:r>
+              <a:r>
+                <a:rPr lang="en-AU" sz="2400" baseline="-25000" dirty="0" smtClean="0"/>
                 <a:t>2</a:t>
               </a:r>
-              <a:endParaRPr lang="en-AU" baseline="-25000" dirty="0"/>
+              <a:endParaRPr lang="en-AU" sz="2400" baseline="-25000" dirty="0"/>
+            </a:p>
+          </p:txBody>
+        </p:sp>
+        <p:sp>
+          <p:nvSpPr>
+            <p:cNvPr id="66" name="TextBox 65"/>
+            <p:cNvSpPr txBox="1"/>
+            <p:nvPr/>
+          </p:nvSpPr>
+          <p:spPr>
+            <a:xfrm>
+              <a:off x="8068103" y="7112953"/>
+              <a:ext cx="646176" cy="461665"/>
+            </a:xfrm>
+            <a:prstGeom prst="rect">
+              <a:avLst/>
+            </a:prstGeom>
+            <a:noFill/>
+          </p:spPr>
+          <p:txBody>
+            <a:bodyPr wrap="square" rtlCol="0">
+              <a:spAutoFit/>
+            </a:bodyPr>
+            <a:lstStyle/>
+            <a:p>
+              <a:pPr algn="ctr"/>
+              <a:r>
+                <a:rPr lang="el-GR" sz="2400" dirty="0" smtClean="0"/>
+                <a:t>η</a:t>
+              </a:r>
+              <a:r>
+                <a:rPr lang="en-AU" sz="2400" baseline="-25000" dirty="0" smtClean="0"/>
+                <a:t>3</a:t>
+              </a:r>
+              <a:endParaRPr lang="en-AU" sz="2400" baseline="-25000" dirty="0"/>
+            </a:p>
+          </p:txBody>
+        </p:sp>
+        <p:sp>
+          <p:nvSpPr>
+            <p:cNvPr id="67" name="TextBox 66"/>
+            <p:cNvSpPr txBox="1"/>
+            <p:nvPr/>
+          </p:nvSpPr>
+          <p:spPr>
+            <a:xfrm>
+              <a:off x="5999287" y="6737169"/>
+              <a:ext cx="646176" cy="461665"/>
+            </a:xfrm>
+            <a:prstGeom prst="rect">
+              <a:avLst/>
+            </a:prstGeom>
+            <a:noFill/>
+          </p:spPr>
+          <p:txBody>
+            <a:bodyPr wrap="square" rtlCol="0">
+              <a:spAutoFit/>
+            </a:bodyPr>
+            <a:lstStyle/>
+            <a:p>
+              <a:pPr algn="ctr"/>
+              <a:r>
+                <a:rPr lang="el-GR" sz="2400" dirty="0" smtClean="0"/>
+                <a:t>η</a:t>
+              </a:r>
+              <a:r>
+                <a:rPr lang="en-AU" sz="2400" baseline="-25000" dirty="0"/>
+                <a:t>4</a:t>
+              </a:r>
+            </a:p>
+          </p:txBody>
+        </p:sp>
+        <p:sp>
+          <p:nvSpPr>
+            <p:cNvPr id="68" name="TextBox 67"/>
+            <p:cNvSpPr txBox="1"/>
+            <p:nvPr/>
+          </p:nvSpPr>
+          <p:spPr>
+            <a:xfrm>
+              <a:off x="4461261" y="6975716"/>
+              <a:ext cx="646176" cy="461665"/>
+            </a:xfrm>
+            <a:prstGeom prst="rect">
+              <a:avLst/>
+            </a:prstGeom>
+            <a:noFill/>
+          </p:spPr>
+          <p:txBody>
+            <a:bodyPr wrap="square" rtlCol="0">
+              <a:spAutoFit/>
+            </a:bodyPr>
+            <a:lstStyle/>
+            <a:p>
+              <a:pPr algn="ctr"/>
+              <a:r>
+                <a:rPr lang="el-GR" sz="2400" dirty="0" smtClean="0"/>
+                <a:t>η</a:t>
+              </a:r>
+              <a:r>
+                <a:rPr lang="en-AU" sz="2400" baseline="-25000" dirty="0" smtClean="0"/>
+                <a:t>5</a:t>
+              </a:r>
+              <a:endParaRPr lang="en-AU" sz="2400" baseline="-25000" dirty="0"/>
+            </a:p>
+          </p:txBody>
+        </p:sp>
+        <p:cxnSp>
+          <p:nvCxnSpPr>
+            <p:cNvPr id="74" name="Straight Arrow Connector 73"/>
+            <p:cNvCxnSpPr>
+              <a:stCxn id="6" idx="3"/>
+            </p:cNvCxnSpPr>
+            <p:nvPr/>
+          </p:nvCxnSpPr>
+          <p:spPr>
+            <a:xfrm>
+              <a:off x="3825826" y="8318518"/>
+              <a:ext cx="1230309" cy="989538"/>
+            </a:xfrm>
+            <a:prstGeom prst="straightConnector1">
+              <a:avLst/>
+            </a:prstGeom>
+            <a:ln>
+              <a:tailEnd type="triangle"/>
+            </a:ln>
+          </p:spPr>
+          <p:style>
+            <a:lnRef idx="1">
+              <a:schemeClr val="accent1"/>
+            </a:lnRef>
+            <a:fillRef idx="0">
+              <a:schemeClr val="accent1"/>
+            </a:fillRef>
+            <a:effectRef idx="0">
+              <a:schemeClr val="accent1"/>
+            </a:effectRef>
+            <a:fontRef idx="minor">
+              <a:schemeClr val="tx1"/>
+            </a:fontRef>
+          </p:style>
+        </p:cxnSp>
+        <p:cxnSp>
+          <p:nvCxnSpPr>
+            <p:cNvPr id="78" name="Straight Arrow Connector 77"/>
+            <p:cNvCxnSpPr>
+              <a:stCxn id="97" idx="2"/>
+            </p:cNvCxnSpPr>
+            <p:nvPr/>
+          </p:nvCxnSpPr>
+          <p:spPr>
+            <a:xfrm>
+              <a:off x="9115761" y="8714182"/>
+              <a:ext cx="0" cy="685850"/>
+            </a:xfrm>
+            <a:prstGeom prst="straightConnector1">
+              <a:avLst/>
+            </a:prstGeom>
+            <a:ln>
+              <a:tailEnd type="triangle"/>
+            </a:ln>
+          </p:spPr>
+          <p:style>
+            <a:lnRef idx="1">
+              <a:schemeClr val="accent1"/>
+            </a:lnRef>
+            <a:fillRef idx="0">
+              <a:schemeClr val="accent1"/>
+            </a:fillRef>
+            <a:effectRef idx="0">
+              <a:schemeClr val="accent1"/>
+            </a:effectRef>
+            <a:fontRef idx="minor">
+              <a:schemeClr val="tx1"/>
+            </a:fontRef>
+          </p:style>
+        </p:cxnSp>
+        <p:sp>
+          <p:nvSpPr>
+            <p:cNvPr id="87" name="TextBox 86"/>
+            <p:cNvSpPr txBox="1"/>
+            <p:nvPr/>
+          </p:nvSpPr>
+          <p:spPr>
+            <a:xfrm>
+              <a:off x="4461261" y="8466833"/>
+              <a:ext cx="646176" cy="461665"/>
+            </a:xfrm>
+            <a:prstGeom prst="rect">
+              <a:avLst/>
+            </a:prstGeom>
+            <a:noFill/>
+          </p:spPr>
+          <p:txBody>
+            <a:bodyPr wrap="square" rtlCol="0">
+              <a:spAutoFit/>
+            </a:bodyPr>
+            <a:lstStyle/>
+            <a:p>
+              <a:pPr algn="ctr"/>
+              <a:r>
+                <a:rPr lang="el-GR" sz="2400" dirty="0" smtClean="0"/>
+                <a:t>γ</a:t>
+              </a:r>
+              <a:r>
+                <a:rPr lang="en-AU" sz="2400" baseline="-25000" dirty="0" smtClean="0"/>
+                <a:t>3</a:t>
+              </a:r>
+              <a:endParaRPr lang="en-AU" sz="2400" baseline="-25000" dirty="0"/>
+            </a:p>
+          </p:txBody>
+        </p:sp>
+        <p:sp>
+          <p:nvSpPr>
+            <p:cNvPr id="88" name="TextBox 87"/>
+            <p:cNvSpPr txBox="1"/>
+            <p:nvPr/>
+          </p:nvSpPr>
+          <p:spPr>
+            <a:xfrm>
+              <a:off x="9082295" y="8765558"/>
+              <a:ext cx="646176" cy="461665"/>
+            </a:xfrm>
+            <a:prstGeom prst="rect">
+              <a:avLst/>
+            </a:prstGeom>
+            <a:noFill/>
+          </p:spPr>
+          <p:txBody>
+            <a:bodyPr wrap="square" rtlCol="0">
+              <a:spAutoFit/>
+            </a:bodyPr>
+            <a:lstStyle/>
+            <a:p>
+              <a:pPr algn="ctr"/>
+              <a:r>
+                <a:rPr lang="el-GR" sz="2400" dirty="0" smtClean="0"/>
+                <a:t>γ</a:t>
+              </a:r>
+              <a:r>
+                <a:rPr lang="en-AU" sz="2400" baseline="-25000" dirty="0"/>
+                <a:t>6</a:t>
+              </a:r>
             </a:p>
           </p:txBody>
         </p:sp>
@@ -4478,7 +5518,7 @@
 <file path=ppt/theme/theme1.xml><?xml version="1.0" encoding="utf-8"?>
 <a:theme xmlns:a="http://schemas.openxmlformats.org/drawingml/2006/main" name="Office Theme">
   <a:themeElements>
-    <a:clrScheme name="Office">
+    <a:clrScheme name="Office Theme">
       <a:dk1>
         <a:sysClr val="windowText" lastClr="000000"/>
       </a:dk1>
@@ -4516,7 +5556,7 @@
         <a:srgbClr val="954F72"/>
       </a:folHlink>
     </a:clrScheme>
-    <a:fontScheme name="Office">
+    <a:fontScheme name="Office Theme">
       <a:majorFont>
         <a:latin typeface="Calibri Light" panose="020F0302020204030204"/>
         <a:ea typeface=""/>
@@ -4588,7 +5628,7 @@
         <a:font script="Geor" typeface="Sylfaen"/>
       </a:minorFont>
     </a:fontScheme>
-    <a:fmtScheme name="Office">
+    <a:fmtScheme name="Office Theme">
       <a:fillStyleLst>
         <a:solidFill>
           <a:schemeClr val="phClr"/>

</xml_diff>

<commit_message>
Update of analysis and plots
Update of analysis and plots for preliminary results
</commit_message>
<xml_diff>
--- a/figs/path_model.pptx
+++ b/figs/path_model.pptx
@@ -243,7 +243,7 @@
           <a:p>
             <a:fld id="{DB7CD7B3-52EF-468D-94B0-37918E93325C}" type="datetimeFigureOut">
               <a:rPr lang="en-AU" smtClean="0"/>
-              <a:t>6/10/2019</a:t>
+              <a:t>12/10/2019</a:t>
             </a:fld>
             <a:endParaRPr lang="en-AU"/>
           </a:p>
@@ -413,7 +413,7 @@
           <a:p>
             <a:fld id="{DB7CD7B3-52EF-468D-94B0-37918E93325C}" type="datetimeFigureOut">
               <a:rPr lang="en-AU" smtClean="0"/>
-              <a:t>6/10/2019</a:t>
+              <a:t>12/10/2019</a:t>
             </a:fld>
             <a:endParaRPr lang="en-AU"/>
           </a:p>
@@ -593,7 +593,7 @@
           <a:p>
             <a:fld id="{DB7CD7B3-52EF-468D-94B0-37918E93325C}" type="datetimeFigureOut">
               <a:rPr lang="en-AU" smtClean="0"/>
-              <a:t>6/10/2019</a:t>
+              <a:t>12/10/2019</a:t>
             </a:fld>
             <a:endParaRPr lang="en-AU"/>
           </a:p>
@@ -763,7 +763,7 @@
           <a:p>
             <a:fld id="{DB7CD7B3-52EF-468D-94B0-37918E93325C}" type="datetimeFigureOut">
               <a:rPr lang="en-AU" smtClean="0"/>
-              <a:t>6/10/2019</a:t>
+              <a:t>12/10/2019</a:t>
             </a:fld>
             <a:endParaRPr lang="en-AU"/>
           </a:p>
@@ -1007,7 +1007,7 @@
           <a:p>
             <a:fld id="{DB7CD7B3-52EF-468D-94B0-37918E93325C}" type="datetimeFigureOut">
               <a:rPr lang="en-AU" smtClean="0"/>
-              <a:t>6/10/2019</a:t>
+              <a:t>12/10/2019</a:t>
             </a:fld>
             <a:endParaRPr lang="en-AU"/>
           </a:p>
@@ -1239,7 +1239,7 @@
           <a:p>
             <a:fld id="{DB7CD7B3-52EF-468D-94B0-37918E93325C}" type="datetimeFigureOut">
               <a:rPr lang="en-AU" smtClean="0"/>
-              <a:t>6/10/2019</a:t>
+              <a:t>12/10/2019</a:t>
             </a:fld>
             <a:endParaRPr lang="en-AU"/>
           </a:p>
@@ -1606,7 +1606,7 @@
           <a:p>
             <a:fld id="{DB7CD7B3-52EF-468D-94B0-37918E93325C}" type="datetimeFigureOut">
               <a:rPr lang="en-AU" smtClean="0"/>
-              <a:t>6/10/2019</a:t>
+              <a:t>12/10/2019</a:t>
             </a:fld>
             <a:endParaRPr lang="en-AU"/>
           </a:p>
@@ -1724,7 +1724,7 @@
           <a:p>
             <a:fld id="{DB7CD7B3-52EF-468D-94B0-37918E93325C}" type="datetimeFigureOut">
               <a:rPr lang="en-AU" smtClean="0"/>
-              <a:t>6/10/2019</a:t>
+              <a:t>12/10/2019</a:t>
             </a:fld>
             <a:endParaRPr lang="en-AU"/>
           </a:p>
@@ -1819,7 +1819,7 @@
           <a:p>
             <a:fld id="{DB7CD7B3-52EF-468D-94B0-37918E93325C}" type="datetimeFigureOut">
               <a:rPr lang="en-AU" smtClean="0"/>
-              <a:t>6/10/2019</a:t>
+              <a:t>12/10/2019</a:t>
             </a:fld>
             <a:endParaRPr lang="en-AU"/>
           </a:p>
@@ -2096,7 +2096,7 @@
           <a:p>
             <a:fld id="{DB7CD7B3-52EF-468D-94B0-37918E93325C}" type="datetimeFigureOut">
               <a:rPr lang="en-AU" smtClean="0"/>
-              <a:t>6/10/2019</a:t>
+              <a:t>12/10/2019</a:t>
             </a:fld>
             <a:endParaRPr lang="en-AU"/>
           </a:p>
@@ -2353,7 +2353,7 @@
           <a:p>
             <a:fld id="{DB7CD7B3-52EF-468D-94B0-37918E93325C}" type="datetimeFigureOut">
               <a:rPr lang="en-AU" smtClean="0"/>
-              <a:t>6/10/2019</a:t>
+              <a:t>12/10/2019</a:t>
             </a:fld>
             <a:endParaRPr lang="en-AU"/>
           </a:p>
@@ -2566,7 +2566,7 @@
           <a:p>
             <a:fld id="{DB7CD7B3-52EF-468D-94B0-37918E93325C}" type="datetimeFigureOut">
               <a:rPr lang="en-AU" smtClean="0"/>
-              <a:t>6/10/2019</a:t>
+              <a:t>12/10/2019</a:t>
             </a:fld>
             <a:endParaRPr lang="en-AU"/>
           </a:p>
@@ -2973,7 +2973,7 @@
       </p:grpSpPr>
       <p:grpSp>
         <p:nvGrpSpPr>
-          <p:cNvPr id="31" name="Group 30"/>
+          <p:cNvPr id="228" name="Group 227"/>
           <p:cNvGrpSpPr/>
           <p:nvPr/>
         </p:nvGrpSpPr>
@@ -4700,7 +4700,6 @@
                 <a:rPr lang="en-AU" sz="2400" baseline="-25000" dirty="0"/>
                 <a:t>4</a:t>
               </a:r>
-              <a:endParaRPr lang="en-AU" sz="2400" baseline="-25000" dirty="0"/>
             </a:p>
           </p:txBody>
         </p:sp>
@@ -4735,7 +4734,6 @@
                 <a:rPr lang="en-AU" sz="2400" baseline="-25000" dirty="0"/>
                 <a:t>5</a:t>
               </a:r>
-              <a:endParaRPr lang="en-AU" sz="2400" baseline="-25000" dirty="0"/>
             </a:p>
           </p:txBody>
         </p:sp>
@@ -4770,7 +4768,6 @@
                 <a:rPr lang="en-AU" sz="2400" baseline="-25000" dirty="0"/>
                 <a:t>7</a:t>
               </a:r>
-              <a:endParaRPr lang="en-AU" sz="2400" baseline="-25000" dirty="0"/>
             </a:p>
           </p:txBody>
         </p:sp>
@@ -4805,7 +4802,6 @@
                 <a:rPr lang="en-AU" sz="2400" baseline="-25000" dirty="0"/>
                 <a:t>8</a:t>
               </a:r>
-              <a:endParaRPr lang="en-AU" sz="2400" baseline="-25000" dirty="0"/>
             </a:p>
           </p:txBody>
         </p:sp>
@@ -4840,7 +4836,6 @@
                 <a:rPr lang="en-AU" sz="2400" baseline="-25000" dirty="0"/>
                 <a:t>9</a:t>
               </a:r>
-              <a:endParaRPr lang="en-AU" sz="2400" baseline="-25000" dirty="0"/>
             </a:p>
           </p:txBody>
         </p:sp>
@@ -4868,14 +4863,13 @@
             <a:p>
               <a:pPr algn="ctr"/>
               <a:r>
-                <a:rPr lang="el-GR" sz="2400" dirty="0"/>
+                <a:rPr lang="el-GR" sz="2400" dirty="0" smtClean="0"/>
                 <a:t>β</a:t>
               </a:r>
               <a:r>
-                <a:rPr lang="en-AU" sz="2400" baseline="-25000" dirty="0" smtClean="0"/>
-                <a:t>1</a:t>
-              </a:r>
-              <a:endParaRPr lang="en-AU" sz="2400" baseline="-25000" dirty="0"/>
+                <a:rPr lang="en-AU" sz="2400" baseline="-25000" dirty="0"/>
+                <a:t>3</a:t>
+              </a:r>
             </a:p>
           </p:txBody>
         </p:sp>
@@ -4941,10 +4935,9 @@
                 <a:t>β</a:t>
               </a:r>
               <a:r>
-                <a:rPr lang="en-AU" sz="2400" baseline="-25000" dirty="0" smtClean="0"/>
-                <a:t>3</a:t>
-              </a:r>
-              <a:endParaRPr lang="en-AU" sz="2400" baseline="-25000" dirty="0"/>
+                <a:rPr lang="en-AU" sz="2400" baseline="-25000" dirty="0"/>
+                <a:t>1</a:t>
+              </a:r>
             </a:p>
           </p:txBody>
         </p:sp>
@@ -4956,7 +4949,7 @@
           </p:nvSpPr>
           <p:spPr>
             <a:xfrm>
-              <a:off x="9786322" y="3786728"/>
+              <a:off x="9659176" y="4028516"/>
               <a:ext cx="646176" cy="461665"/>
             </a:xfrm>
             <a:prstGeom prst="rect">
@@ -4973,11 +4966,11 @@
               <a:pPr algn="ctr"/>
               <a:r>
                 <a:rPr lang="el-GR" sz="2400" dirty="0" smtClean="0"/>
-                <a:t>β</a:t>
+                <a:t>η</a:t>
               </a:r>
               <a:r>
                 <a:rPr lang="en-AU" sz="2400" baseline="-25000" dirty="0"/>
-                <a:t>4</a:t>
+                <a:t>3</a:t>
               </a:r>
             </a:p>
           </p:txBody>
@@ -5007,7 +5000,7 @@
               <a:pPr algn="ctr"/>
               <a:r>
                 <a:rPr lang="el-GR" sz="2400" dirty="0" smtClean="0"/>
-                <a:t>β</a:t>
+                <a:t>η</a:t>
               </a:r>
               <a:r>
                 <a:rPr lang="en-AU" sz="2400" baseline="-25000" dirty="0" smtClean="0"/>
@@ -5045,10 +5038,9 @@
                 <a:t>β</a:t>
               </a:r>
               <a:r>
-                <a:rPr lang="en-AU" sz="2400" baseline="-25000" dirty="0" smtClean="0"/>
-                <a:t>6</a:t>
-              </a:r>
-              <a:endParaRPr lang="en-AU" sz="2400" baseline="-25000" dirty="0"/>
+                <a:rPr lang="en-AU" sz="2400" baseline="-25000" dirty="0"/>
+                <a:t>4</a:t>
+              </a:r>
             </a:p>
           </p:txBody>
         </p:sp>
@@ -5081,7 +5073,7 @@
               </a:r>
               <a:r>
                 <a:rPr lang="en-AU" sz="2400" baseline="-25000" dirty="0"/>
-                <a:t>7</a:t>
+                <a:t>5</a:t>
               </a:r>
             </a:p>
           </p:txBody>
@@ -5115,7 +5107,7 @@
               </a:r>
               <a:r>
                 <a:rPr lang="en-AU" sz="2400" baseline="-25000" dirty="0"/>
-                <a:t>8</a:t>
+                <a:t>6</a:t>
               </a:r>
             </a:p>
           </p:txBody>
@@ -5149,7 +5141,7 @@
               </a:r>
               <a:r>
                 <a:rPr lang="en-AU" sz="2400" baseline="-25000" dirty="0"/>
-                <a:t>9</a:t>
+                <a:t>7</a:t>
               </a:r>
             </a:p>
           </p:txBody>
@@ -5286,10 +5278,9 @@
                 <a:t>η</a:t>
               </a:r>
               <a:r>
-                <a:rPr lang="en-AU" sz="2400" baseline="-25000" dirty="0" smtClean="0"/>
-                <a:t>3</a:t>
-              </a:r>
-              <a:endParaRPr lang="en-AU" sz="2400" baseline="-25000" dirty="0"/>
+                <a:rPr lang="en-AU" sz="2400" baseline="-25000" dirty="0"/>
+                <a:t>4</a:t>
+              </a:r>
             </a:p>
           </p:txBody>
         </p:sp>
@@ -5322,7 +5313,7 @@
               </a:r>
               <a:r>
                 <a:rPr lang="en-AU" sz="2400" baseline="-25000" dirty="0"/>
-                <a:t>4</a:t>
+                <a:t>6</a:t>
               </a:r>
             </a:p>
           </p:txBody>
@@ -5356,7 +5347,7 @@
               </a:r>
               <a:r>
                 <a:rPr lang="en-AU" sz="2400" baseline="-25000" dirty="0" smtClean="0"/>
-                <a:t>5</a:t>
+                <a:t>7</a:t>
               </a:r>
               <a:endParaRPr lang="en-AU" sz="2400" baseline="-25000" dirty="0"/>
             </a:p>
@@ -5498,6 +5489,225 @@
                 <a:rPr lang="en-AU" sz="2400" baseline="-25000" dirty="0"/>
                 <a:t>6</a:t>
               </a:r>
+            </a:p>
+          </p:txBody>
+        </p:sp>
+        <p:cxnSp>
+          <p:nvCxnSpPr>
+            <p:cNvPr id="71" name="Curved Connector 70"/>
+            <p:cNvCxnSpPr>
+              <a:stCxn id="96" idx="3"/>
+              <a:endCxn id="4" idx="6"/>
+            </p:cNvCxnSpPr>
+            <p:nvPr/>
+          </p:nvCxnSpPr>
+          <p:spPr>
+            <a:xfrm flipH="1">
+              <a:off x="7314454" y="591838"/>
+              <a:ext cx="2233718" cy="3726113"/>
+            </a:xfrm>
+            <a:prstGeom prst="curvedConnector3">
+              <a:avLst>
+                <a:gd name="adj1" fmla="val -24971"/>
+              </a:avLst>
+            </a:prstGeom>
+            <a:ln>
+              <a:tailEnd type="triangle"/>
+            </a:ln>
+          </p:spPr>
+          <p:style>
+            <a:lnRef idx="1">
+              <a:schemeClr val="accent1"/>
+            </a:lnRef>
+            <a:fillRef idx="0">
+              <a:schemeClr val="accent1"/>
+            </a:fillRef>
+            <a:effectRef idx="0">
+              <a:schemeClr val="accent1"/>
+            </a:effectRef>
+            <a:fontRef idx="minor">
+              <a:schemeClr val="tx1"/>
+            </a:fontRef>
+          </p:style>
+        </p:cxnSp>
+        <p:sp>
+          <p:nvSpPr>
+            <p:cNvPr id="75" name="TextBox 74"/>
+            <p:cNvSpPr txBox="1"/>
+            <p:nvPr/>
+          </p:nvSpPr>
+          <p:spPr>
+            <a:xfrm>
+              <a:off x="9534318" y="1834130"/>
+              <a:ext cx="646176" cy="461665"/>
+            </a:xfrm>
+            <a:prstGeom prst="rect">
+              <a:avLst/>
+            </a:prstGeom>
+            <a:noFill/>
+          </p:spPr>
+          <p:txBody>
+            <a:bodyPr wrap="square" rtlCol="0">
+              <a:spAutoFit/>
+            </a:bodyPr>
+            <a:lstStyle/>
+            <a:p>
+              <a:pPr algn="ctr"/>
+              <a:r>
+                <a:rPr lang="el-GR" sz="2400" dirty="0" smtClean="0"/>
+                <a:t>α</a:t>
+              </a:r>
+              <a:r>
+                <a:rPr lang="en-AU" sz="2400" baseline="-25000" dirty="0"/>
+                <a:t>4</a:t>
+              </a:r>
+              <a:endParaRPr lang="en-AU" sz="2400" baseline="-25000" dirty="0"/>
+            </a:p>
+          </p:txBody>
+        </p:sp>
+        <p:cxnSp>
+          <p:nvCxnSpPr>
+            <p:cNvPr id="76" name="Curved Connector 75"/>
+            <p:cNvCxnSpPr>
+              <a:stCxn id="97" idx="3"/>
+              <a:endCxn id="4" idx="6"/>
+            </p:cNvCxnSpPr>
+            <p:nvPr/>
+          </p:nvCxnSpPr>
+          <p:spPr>
+            <a:xfrm flipH="1" flipV="1">
+              <a:off x="7314454" y="4317951"/>
+              <a:ext cx="2693158" cy="4004345"/>
+            </a:xfrm>
+            <a:prstGeom prst="curvedConnector3">
+              <a:avLst>
+                <a:gd name="adj1" fmla="val -9846"/>
+              </a:avLst>
+            </a:prstGeom>
+            <a:ln>
+              <a:tailEnd type="triangle"/>
+            </a:ln>
+          </p:spPr>
+          <p:style>
+            <a:lnRef idx="1">
+              <a:schemeClr val="accent1"/>
+            </a:lnRef>
+            <a:fillRef idx="0">
+              <a:schemeClr val="accent1"/>
+            </a:fillRef>
+            <a:effectRef idx="0">
+              <a:schemeClr val="accent1"/>
+            </a:effectRef>
+            <a:fontRef idx="minor">
+              <a:schemeClr val="tx1"/>
+            </a:fontRef>
+          </p:style>
+        </p:cxnSp>
+        <p:sp>
+          <p:nvSpPr>
+            <p:cNvPr id="79" name="TextBox 78"/>
+            <p:cNvSpPr txBox="1"/>
+            <p:nvPr/>
+          </p:nvSpPr>
+          <p:spPr>
+            <a:xfrm>
+              <a:off x="9673047" y="4943154"/>
+              <a:ext cx="646176" cy="461665"/>
+            </a:xfrm>
+            <a:prstGeom prst="rect">
+              <a:avLst/>
+            </a:prstGeom>
+            <a:noFill/>
+          </p:spPr>
+          <p:txBody>
+            <a:bodyPr wrap="square" rtlCol="0">
+              <a:spAutoFit/>
+            </a:bodyPr>
+            <a:lstStyle/>
+            <a:p>
+              <a:pPr algn="ctr"/>
+              <a:r>
+                <a:rPr lang="el-GR" sz="2400" dirty="0" smtClean="0"/>
+                <a:t>α</a:t>
+              </a:r>
+              <a:r>
+                <a:rPr lang="en-AU" sz="2400" baseline="-25000" dirty="0" smtClean="0"/>
+                <a:t>5</a:t>
+              </a:r>
+              <a:endParaRPr lang="en-AU" sz="2400" baseline="-25000" dirty="0"/>
+            </a:p>
+          </p:txBody>
+        </p:sp>
+        <p:cxnSp>
+          <p:nvCxnSpPr>
+            <p:cNvPr id="80" name="Curved Connector 79"/>
+            <p:cNvCxnSpPr>
+              <a:stCxn id="97" idx="3"/>
+            </p:cNvCxnSpPr>
+            <p:nvPr/>
+          </p:nvCxnSpPr>
+          <p:spPr>
+            <a:xfrm flipH="1" flipV="1">
+              <a:off x="9956916" y="3121318"/>
+              <a:ext cx="50696" cy="5200978"/>
+            </a:xfrm>
+            <a:prstGeom prst="curvedConnector4">
+              <a:avLst>
+                <a:gd name="adj1" fmla="val -1316696"/>
+                <a:gd name="adj2" fmla="val 96900"/>
+              </a:avLst>
+            </a:prstGeom>
+            <a:ln>
+              <a:tailEnd type="triangle"/>
+            </a:ln>
+          </p:spPr>
+          <p:style>
+            <a:lnRef idx="1">
+              <a:schemeClr val="accent1"/>
+            </a:lnRef>
+            <a:fillRef idx="0">
+              <a:schemeClr val="accent1"/>
+            </a:fillRef>
+            <a:effectRef idx="0">
+              <a:schemeClr val="accent1"/>
+            </a:effectRef>
+            <a:fontRef idx="minor">
+              <a:schemeClr val="tx1"/>
+            </a:fontRef>
+          </p:style>
+        </p:cxnSp>
+        <p:sp>
+          <p:nvSpPr>
+            <p:cNvPr id="98" name="TextBox 97"/>
+            <p:cNvSpPr txBox="1"/>
+            <p:nvPr/>
+          </p:nvSpPr>
+          <p:spPr>
+            <a:xfrm>
+              <a:off x="10426773" y="3509326"/>
+              <a:ext cx="646176" cy="461665"/>
+            </a:xfrm>
+            <a:prstGeom prst="rect">
+              <a:avLst/>
+            </a:prstGeom>
+            <a:noFill/>
+          </p:spPr>
+          <p:txBody>
+            <a:bodyPr wrap="square" rtlCol="0">
+              <a:spAutoFit/>
+            </a:bodyPr>
+            <a:lstStyle/>
+            <a:p>
+              <a:pPr algn="ctr"/>
+              <a:r>
+                <a:rPr lang="el-GR" sz="2400" dirty="0" smtClean="0"/>
+                <a:t>α</a:t>
+              </a:r>
+              <a:r>
+                <a:rPr lang="en-AU" sz="2400" baseline="-25000" dirty="0" smtClean="0"/>
+                <a:t>6</a:t>
+              </a:r>
+              <a:endParaRPr lang="en-AU" sz="2400" baseline="-25000" dirty="0"/>
             </a:p>
           </p:txBody>
         </p:sp>

</xml_diff>